<commit_message>
atualizacao automatos e ajuste da tabela
</commit_message>
<xml_diff>
--- a/docs/PavoAutomatons.pptx
+++ b/docs/PavoAutomatons.pptx
@@ -15,8 +15,9 @@
     <p:sldId id="262" r:id="rId9"/>
     <p:sldId id="264" r:id="rId10"/>
     <p:sldId id="265" r:id="rId11"/>
-    <p:sldId id="266" r:id="rId12"/>
-    <p:sldId id="263" r:id="rId13"/>
+    <p:sldId id="268" r:id="rId12"/>
+    <p:sldId id="266" r:id="rId13"/>
+    <p:sldId id="263" r:id="rId14"/>
   </p:sldIdLst>
   <p:sldSz cx="12192000" cy="6858000"/>
   <p:notesSz cx="6858000" cy="9144000"/>
@@ -115,6 +116,11 @@
       </a:defRPr>
     </a:lvl9pPr>
   </p:defaultTextStyle>
+  <p:extLst>
+    <p:ext uri="{EFAFB233-063F-42B5-8137-9DF3F51BA10A}">
+      <p15:sldGuideLst xmlns:p15="http://schemas.microsoft.com/office/powerpoint/2012/main"/>
+    </p:ext>
+  </p:extLst>
 </p:presentation>
 </file>
 
@@ -265,7 +271,7 @@
           <a:p>
             <a:fld id="{951E67F8-B24B-4D0A-9786-15B6C19B3912}" type="datetimeFigureOut">
               <a:rPr lang="pt-BR" smtClean="0"/>
-              <a:t>13/03/2021</a:t>
+              <a:t>14/03/2021</a:t>
             </a:fld>
             <a:endParaRPr lang="pt-BR"/>
           </a:p>
@@ -463,7 +469,7 @@
           <a:p>
             <a:fld id="{951E67F8-B24B-4D0A-9786-15B6C19B3912}" type="datetimeFigureOut">
               <a:rPr lang="pt-BR" smtClean="0"/>
-              <a:t>13/03/2021</a:t>
+              <a:t>14/03/2021</a:t>
             </a:fld>
             <a:endParaRPr lang="pt-BR"/>
           </a:p>
@@ -671,7 +677,7 @@
           <a:p>
             <a:fld id="{951E67F8-B24B-4D0A-9786-15B6C19B3912}" type="datetimeFigureOut">
               <a:rPr lang="pt-BR" smtClean="0"/>
-              <a:t>13/03/2021</a:t>
+              <a:t>14/03/2021</a:t>
             </a:fld>
             <a:endParaRPr lang="pt-BR"/>
           </a:p>
@@ -869,7 +875,7 @@
           <a:p>
             <a:fld id="{951E67F8-B24B-4D0A-9786-15B6C19B3912}" type="datetimeFigureOut">
               <a:rPr lang="pt-BR" smtClean="0"/>
-              <a:t>13/03/2021</a:t>
+              <a:t>14/03/2021</a:t>
             </a:fld>
             <a:endParaRPr lang="pt-BR"/>
           </a:p>
@@ -1144,7 +1150,7 @@
           <a:p>
             <a:fld id="{951E67F8-B24B-4D0A-9786-15B6C19B3912}" type="datetimeFigureOut">
               <a:rPr lang="pt-BR" smtClean="0"/>
-              <a:t>13/03/2021</a:t>
+              <a:t>14/03/2021</a:t>
             </a:fld>
             <a:endParaRPr lang="pt-BR"/>
           </a:p>
@@ -1409,7 +1415,7 @@
           <a:p>
             <a:fld id="{951E67F8-B24B-4D0A-9786-15B6C19B3912}" type="datetimeFigureOut">
               <a:rPr lang="pt-BR" smtClean="0"/>
-              <a:t>13/03/2021</a:t>
+              <a:t>14/03/2021</a:t>
             </a:fld>
             <a:endParaRPr lang="pt-BR"/>
           </a:p>
@@ -1821,7 +1827,7 @@
           <a:p>
             <a:fld id="{951E67F8-B24B-4D0A-9786-15B6C19B3912}" type="datetimeFigureOut">
               <a:rPr lang="pt-BR" smtClean="0"/>
-              <a:t>13/03/2021</a:t>
+              <a:t>14/03/2021</a:t>
             </a:fld>
             <a:endParaRPr lang="pt-BR"/>
           </a:p>
@@ -1962,7 +1968,7 @@
           <a:p>
             <a:fld id="{951E67F8-B24B-4D0A-9786-15B6C19B3912}" type="datetimeFigureOut">
               <a:rPr lang="pt-BR" smtClean="0"/>
-              <a:t>13/03/2021</a:t>
+              <a:t>14/03/2021</a:t>
             </a:fld>
             <a:endParaRPr lang="pt-BR"/>
           </a:p>
@@ -2075,7 +2081,7 @@
           <a:p>
             <a:fld id="{951E67F8-B24B-4D0A-9786-15B6C19B3912}" type="datetimeFigureOut">
               <a:rPr lang="pt-BR" smtClean="0"/>
-              <a:t>13/03/2021</a:t>
+              <a:t>14/03/2021</a:t>
             </a:fld>
             <a:endParaRPr lang="pt-BR"/>
           </a:p>
@@ -2386,7 +2392,7 @@
           <a:p>
             <a:fld id="{951E67F8-B24B-4D0A-9786-15B6C19B3912}" type="datetimeFigureOut">
               <a:rPr lang="pt-BR" smtClean="0"/>
-              <a:t>13/03/2021</a:t>
+              <a:t>14/03/2021</a:t>
             </a:fld>
             <a:endParaRPr lang="pt-BR"/>
           </a:p>
@@ -2674,7 +2680,7 @@
           <a:p>
             <a:fld id="{951E67F8-B24B-4D0A-9786-15B6C19B3912}" type="datetimeFigureOut">
               <a:rPr lang="pt-BR" smtClean="0"/>
-              <a:t>13/03/2021</a:t>
+              <a:t>14/03/2021</a:t>
             </a:fld>
             <a:endParaRPr lang="pt-BR"/>
           </a:p>
@@ -2915,7 +2921,7 @@
           <a:p>
             <a:fld id="{951E67F8-B24B-4D0A-9786-15B6C19B3912}" type="datetimeFigureOut">
               <a:rPr lang="pt-BR" smtClean="0"/>
-              <a:t>13/03/2021</a:t>
+              <a:t>14/03/2021</a:t>
             </a:fld>
             <a:endParaRPr lang="pt-BR"/>
           </a:p>
@@ -3516,13 +3522,13 @@
   <p:clrMapOvr>
     <a:masterClrMapping/>
   </p:clrMapOvr>
-  <mc:AlternateContent xmlns:mc="http://schemas.openxmlformats.org/markup-compatibility/2006">
-    <mc:Choice xmlns:p159="http://schemas.microsoft.com/office/powerpoint/2015/09/main" Requires="p159">
+  <mc:AlternateContent xmlns:mc="http://schemas.openxmlformats.org/markup-compatibility/2006" xmlns:p159="http://schemas.microsoft.com/office/powerpoint/2015/09/main">
+    <mc:Choice Requires="p159">
       <p:transition xmlns:p14="http://schemas.microsoft.com/office/powerpoint/2010/main" spd="slow" p14:dur="2000">
         <p159:morph option="byObject"/>
       </p:transition>
     </mc:Choice>
-    <mc:Fallback>
+    <mc:Fallback xmlns="">
       <p:transition spd="slow">
         <p:fade/>
       </p:transition>
@@ -3562,7 +3568,7 @@
         </p:nvSpPr>
         <p:spPr>
           <a:xfrm>
-            <a:off x="8200998" y="2388344"/>
+            <a:off x="9129407" y="2388345"/>
             <a:ext cx="876902" cy="307777"/>
           </a:xfrm>
           <a:prstGeom prst="snip1Rect">
@@ -3611,7 +3617,7 @@
         </p:nvSpPr>
         <p:spPr>
           <a:xfrm>
-            <a:off x="8200998" y="2388343"/>
+            <a:off x="9129407" y="2388344"/>
             <a:ext cx="1014838" cy="307777"/>
           </a:xfrm>
           <a:prstGeom prst="rect">
@@ -3663,7 +3669,7 @@
         </p:nvSpPr>
         <p:spPr>
           <a:xfrm>
-            <a:off x="1936568" y="3655526"/>
+            <a:off x="2864977" y="3655527"/>
             <a:ext cx="676405" cy="676406"/>
           </a:xfrm>
           <a:prstGeom prst="flowChartConnector">
@@ -3729,7 +3735,7 @@
         </p:nvCxnSpPr>
         <p:spPr>
           <a:xfrm flipV="1">
-            <a:off x="2612973" y="3983103"/>
+            <a:off x="3541382" y="3983104"/>
             <a:ext cx="2017832" cy="10626"/>
           </a:xfrm>
           <a:prstGeom prst="straightConnector1">
@@ -3771,7 +3777,7 @@
         </p:nvSpPr>
         <p:spPr>
           <a:xfrm>
-            <a:off x="1786972" y="3317323"/>
+            <a:off x="2715381" y="3317324"/>
             <a:ext cx="676405" cy="676406"/>
           </a:xfrm>
           <a:prstGeom prst="circularArrow">
@@ -3833,7 +3839,7 @@
         </p:nvSpPr>
         <p:spPr>
           <a:xfrm rot="19939312">
-            <a:off x="1531817" y="3124740"/>
+            <a:off x="2460226" y="3124741"/>
             <a:ext cx="738100" cy="307777"/>
           </a:xfrm>
           <a:prstGeom prst="rect">
@@ -4052,7 +4058,7 @@
         </p:nvSpPr>
         <p:spPr>
           <a:xfrm>
-            <a:off x="4630805" y="3644900"/>
+            <a:off x="5559214" y="3644901"/>
             <a:ext cx="676405" cy="676406"/>
           </a:xfrm>
           <a:prstGeom prst="flowChartConnector">
@@ -4118,7 +4124,7 @@
         </p:nvCxnSpPr>
         <p:spPr>
           <a:xfrm flipV="1">
-            <a:off x="5307210" y="3869268"/>
+            <a:off x="6235619" y="3869269"/>
             <a:ext cx="1699336" cy="113835"/>
           </a:xfrm>
           <a:prstGeom prst="straightConnector1">
@@ -4163,7 +4169,7 @@
         </p:nvCxnSpPr>
         <p:spPr>
           <a:xfrm>
-            <a:off x="5208153" y="4222249"/>
+            <a:off x="6136562" y="4222250"/>
             <a:ext cx="689420" cy="1035782"/>
           </a:xfrm>
           <a:prstGeom prst="straightConnector1">
@@ -4205,7 +4211,7 @@
         </p:nvSpPr>
         <p:spPr>
           <a:xfrm rot="3172126">
-            <a:off x="5468992" y="4465470"/>
+            <a:off x="6397401" y="4465471"/>
             <a:ext cx="381497" cy="307777"/>
           </a:xfrm>
           <a:prstGeom prst="rect">
@@ -4243,7 +4249,7 @@
         </p:nvSpPr>
         <p:spPr>
           <a:xfrm>
-            <a:off x="2908299" y="3677078"/>
+            <a:off x="3836708" y="3677079"/>
             <a:ext cx="1853232" cy="307777"/>
           </a:xfrm>
           <a:prstGeom prst="rect">
@@ -4288,7 +4294,7 @@
         </p:nvSpPr>
         <p:spPr>
           <a:xfrm rot="21316746">
-            <a:off x="5298198" y="3589204"/>
+            <a:off x="6226607" y="3589205"/>
             <a:ext cx="1853232" cy="307777"/>
           </a:xfrm>
           <a:prstGeom prst="rect">
@@ -4333,7 +4339,7 @@
         </p:nvSpPr>
         <p:spPr>
           <a:xfrm>
-            <a:off x="7006546" y="3531065"/>
+            <a:off x="7934955" y="3531066"/>
             <a:ext cx="676405" cy="676406"/>
           </a:xfrm>
           <a:prstGeom prst="flowChartConnector">
@@ -4395,7 +4401,7 @@
         </p:nvSpPr>
         <p:spPr>
           <a:xfrm>
-            <a:off x="5771181" y="5158974"/>
+            <a:off x="6699590" y="5158975"/>
             <a:ext cx="676405" cy="676406"/>
           </a:xfrm>
           <a:prstGeom prst="flowChartConnector">
@@ -4457,7 +4463,7 @@
         </p:nvSpPr>
         <p:spPr>
           <a:xfrm>
-            <a:off x="5094910" y="2138075"/>
+            <a:off x="6023319" y="2138076"/>
             <a:ext cx="676405" cy="676406"/>
           </a:xfrm>
           <a:prstGeom prst="flowChartConnector">
@@ -4523,7 +4529,7 @@
         </p:nvCxnSpPr>
         <p:spPr>
           <a:xfrm flipV="1">
-            <a:off x="4969008" y="2715424"/>
+            <a:off x="5897417" y="2715425"/>
             <a:ext cx="224959" cy="929476"/>
           </a:xfrm>
           <a:prstGeom prst="straightConnector1">
@@ -4568,7 +4574,7 @@
         </p:nvCxnSpPr>
         <p:spPr>
           <a:xfrm>
-            <a:off x="5771315" y="2476278"/>
+            <a:off x="6699724" y="2476279"/>
             <a:ext cx="1691878" cy="234526"/>
           </a:xfrm>
           <a:prstGeom prst="straightConnector1">
@@ -4610,7 +4616,7 @@
         </p:nvSpPr>
         <p:spPr>
           <a:xfrm rot="504679">
-            <a:off x="5779340" y="2319134"/>
+            <a:off x="6707749" y="2319135"/>
             <a:ext cx="1853232" cy="307777"/>
           </a:xfrm>
           <a:prstGeom prst="rect">
@@ -4655,7 +4661,7 @@
         </p:nvSpPr>
         <p:spPr>
           <a:xfrm>
-            <a:off x="7463058" y="2429869"/>
+            <a:off x="8391467" y="2429870"/>
             <a:ext cx="676405" cy="676406"/>
           </a:xfrm>
           <a:prstGeom prst="donut">
@@ -4718,7 +4724,7 @@
         </p:nvSpPr>
         <p:spPr>
           <a:xfrm rot="17087171">
-            <a:off x="4484469" y="2966618"/>
+            <a:off x="5412878" y="2966619"/>
             <a:ext cx="796604" cy="307777"/>
           </a:xfrm>
           <a:prstGeom prst="rect">
@@ -4763,7 +4769,7 @@
         </p:nvCxnSpPr>
         <p:spPr>
           <a:xfrm flipV="1">
-            <a:off x="5433113" y="1791542"/>
+            <a:off x="6361522" y="1791543"/>
             <a:ext cx="2212003" cy="346533"/>
           </a:xfrm>
           <a:prstGeom prst="straightConnector1">
@@ -4805,7 +4811,7 @@
         </p:nvSpPr>
         <p:spPr>
           <a:xfrm rot="20941508">
-            <a:off x="6049284" y="1655920"/>
+            <a:off x="6977693" y="1655921"/>
             <a:ext cx="796604" cy="307777"/>
           </a:xfrm>
           <a:prstGeom prst="rect">
@@ -4847,7 +4853,7 @@
         </p:nvSpPr>
         <p:spPr>
           <a:xfrm>
-            <a:off x="7645116" y="1415260"/>
+            <a:off x="8573525" y="1415261"/>
             <a:ext cx="676405" cy="676406"/>
           </a:xfrm>
           <a:prstGeom prst="flowChartConnector">
@@ -4892,169 +4898,6 @@
               </a:rPr>
               <a:t>Ex5</a:t>
             </a:r>
-          </a:p>
-        </p:txBody>
-      </p:sp>
-      <p:sp>
-        <p:nvSpPr>
-          <p:cNvPr id="55" name="Retângulo: Único Canto Recortado 54">
-            <a:extLst>
-              <a:ext uri="{FF2B5EF4-FFF2-40B4-BE49-F238E27FC236}">
-                <a16:creationId xmlns:a16="http://schemas.microsoft.com/office/drawing/2014/main" id="{4917EBA9-179B-439D-B3D8-887A8EC72D79}"/>
-              </a:ext>
-            </a:extLst>
-          </p:cNvPr>
-          <p:cNvSpPr/>
-          <p:nvPr/>
-        </p:nvSpPr>
-        <p:spPr>
-          <a:xfrm>
-            <a:off x="6978658" y="5223620"/>
-            <a:ext cx="4116333" cy="734973"/>
-          </a:xfrm>
-          <a:prstGeom prst="snip1Rect">
-            <a:avLst/>
-          </a:prstGeom>
-          <a:solidFill>
-            <a:schemeClr val="bg1">
-              <a:lumMod val="85000"/>
-            </a:schemeClr>
-          </a:solidFill>
-        </p:spPr>
-        <p:style>
-          <a:lnRef idx="2">
-            <a:schemeClr val="accent1">
-              <a:shade val="50000"/>
-            </a:schemeClr>
-          </a:lnRef>
-          <a:fillRef idx="1">
-            <a:schemeClr val="accent1"/>
-          </a:fillRef>
-          <a:effectRef idx="0">
-            <a:schemeClr val="accent1"/>
-          </a:effectRef>
-          <a:fontRef idx="minor">
-            <a:schemeClr val="lt1"/>
-          </a:fontRef>
-        </p:style>
-        <p:txBody>
-          <a:bodyPr rtlCol="0" anchor="ctr"/>
-          <a:lstStyle/>
-          <a:p>
-            <a:pPr algn="ctr"/>
-            <a:endParaRPr lang="pt-BR"/>
-          </a:p>
-        </p:txBody>
-      </p:sp>
-      <p:sp>
-        <p:nvSpPr>
-          <p:cNvPr id="56" name="CaixaDeTexto 55">
-            <a:extLst>
-              <a:ext uri="{FF2B5EF4-FFF2-40B4-BE49-F238E27FC236}">
-                <a16:creationId xmlns:a16="http://schemas.microsoft.com/office/drawing/2014/main" id="{B121591A-A05E-46F7-8F9D-2CCB0CB3A6C3}"/>
-              </a:ext>
-            </a:extLst>
-          </p:cNvPr>
-          <p:cNvSpPr txBox="1"/>
-          <p:nvPr/>
-        </p:nvSpPr>
-        <p:spPr>
-          <a:xfrm>
-            <a:off x="6978658" y="5258031"/>
-            <a:ext cx="4568304" cy="738664"/>
-          </a:xfrm>
-          <a:prstGeom prst="rect">
-            <a:avLst/>
-          </a:prstGeom>
-          <a:noFill/>
-        </p:spPr>
-        <p:txBody>
-          <a:bodyPr wrap="square" rtlCol="0">
-            <a:spAutoFit/>
-          </a:bodyPr>
-          <a:lstStyle/>
-          <a:p>
-            <a:r>
-              <a:rPr lang="en-US" sz="1400" dirty="0">
-                <a:solidFill>
-                  <a:srgbClr val="002060"/>
-                </a:solidFill>
-                <a:latin typeface="Biome" panose="020B0502040204020203" pitchFamily="34" charset="0"/>
-                <a:cs typeface="Biome" panose="020B0502040204020203" pitchFamily="34" charset="0"/>
-              </a:rPr>
-              <a:t>public static </a:t>
-            </a:r>
-            <a:r>
-              <a:rPr lang="en-US" sz="1400" dirty="0" err="1">
-                <a:solidFill>
-                  <a:srgbClr val="002060"/>
-                </a:solidFill>
-                <a:latin typeface="Biome" panose="020B0502040204020203" pitchFamily="34" charset="0"/>
-                <a:cs typeface="Biome" panose="020B0502040204020203" pitchFamily="34" charset="0"/>
-              </a:rPr>
-              <a:t>boolean</a:t>
-            </a:r>
-            <a:r>
-              <a:rPr lang="en-US" sz="1400" dirty="0">
-                <a:solidFill>
-                  <a:srgbClr val="002060"/>
-                </a:solidFill>
-                <a:latin typeface="Biome" panose="020B0502040204020203" pitchFamily="34" charset="0"/>
-                <a:cs typeface="Biome" panose="020B0502040204020203" pitchFamily="34" charset="0"/>
-              </a:rPr>
-              <a:t> </a:t>
-            </a:r>
-            <a:r>
-              <a:rPr lang="en-US" sz="1400" dirty="0" err="1">
-                <a:solidFill>
-                  <a:srgbClr val="002060"/>
-                </a:solidFill>
-                <a:latin typeface="Biome" panose="020B0502040204020203" pitchFamily="34" charset="0"/>
-                <a:cs typeface="Biome" panose="020B0502040204020203" pitchFamily="34" charset="0"/>
-              </a:rPr>
-              <a:t>isSingleQuotes</a:t>
-            </a:r>
-            <a:r>
-              <a:rPr lang="en-US" sz="1400" dirty="0">
-                <a:solidFill>
-                  <a:srgbClr val="002060"/>
-                </a:solidFill>
-                <a:latin typeface="Biome" panose="020B0502040204020203" pitchFamily="34" charset="0"/>
-                <a:cs typeface="Biome" panose="020B0502040204020203" pitchFamily="34" charset="0"/>
-              </a:rPr>
-              <a:t>(char c){</a:t>
-            </a:r>
-          </a:p>
-          <a:p>
-            <a:r>
-              <a:rPr lang="en-US" sz="1400" dirty="0">
-                <a:solidFill>
-                  <a:srgbClr val="002060"/>
-                </a:solidFill>
-                <a:latin typeface="Biome" panose="020B0502040204020203" pitchFamily="34" charset="0"/>
-                <a:cs typeface="Biome" panose="020B0502040204020203" pitchFamily="34" charset="0"/>
-              </a:rPr>
-              <a:t>        return c == '\'';</a:t>
-            </a:r>
-          </a:p>
-          <a:p>
-            <a:r>
-              <a:rPr lang="en-US" sz="1400" dirty="0">
-                <a:solidFill>
-                  <a:srgbClr val="002060"/>
-                </a:solidFill>
-                <a:latin typeface="Biome" panose="020B0502040204020203" pitchFamily="34" charset="0"/>
-                <a:cs typeface="Biome" panose="020B0502040204020203" pitchFamily="34" charset="0"/>
-              </a:rPr>
-              <a:t>    }</a:t>
-            </a:r>
-            <a:endParaRPr lang="pt-BR" sz="1400" dirty="0">
-              <a:solidFill>
-                <a:srgbClr val="002060"/>
-              </a:solidFill>
-              <a:latin typeface="Biome" panose="020B0502040204020203" pitchFamily="34" charset="0"/>
-              <a:cs typeface="Biome" panose="020B0502040204020203" pitchFamily="34" charset="0"/>
-            </a:endParaRPr>
           </a:p>
         </p:txBody>
       </p:sp>
@@ -5068,13 +4911,13 @@
   <p:clrMapOvr>
     <a:masterClrMapping/>
   </p:clrMapOvr>
-  <mc:AlternateContent xmlns:mc="http://schemas.openxmlformats.org/markup-compatibility/2006">
-    <mc:Choice xmlns:p14="http://schemas.microsoft.com/office/powerpoint/2010/main" Requires="p14">
+  <mc:AlternateContent xmlns:mc="http://schemas.openxmlformats.org/markup-compatibility/2006" xmlns:p14="http://schemas.microsoft.com/office/powerpoint/2010/main">
+    <mc:Choice Requires="p14">
       <p:transition spd="med" p14:dur="700">
         <p:fade/>
       </p:transition>
     </mc:Choice>
-    <mc:Fallback>
+    <mc:Fallback xmlns="">
       <p:transition spd="med">
         <p:fade/>
       </p:transition>
@@ -5102,10 +4945,10 @@
       </p:grpSpPr>
       <p:sp>
         <p:nvSpPr>
-          <p:cNvPr id="4" name="Fluxograma: Conector 3">
-            <a:extLst>
-              <a:ext uri="{FF2B5EF4-FFF2-40B4-BE49-F238E27FC236}">
-                <a16:creationId xmlns:a16="http://schemas.microsoft.com/office/drawing/2014/main" id="{3272DDE6-AD5A-4207-86D4-5FD36093EB43}"/>
+          <p:cNvPr id="31" name="Retângulo: Único Canto Recortado 30">
+            <a:extLst>
+              <a:ext uri="{FF2B5EF4-FFF2-40B4-BE49-F238E27FC236}">
+                <a16:creationId xmlns:a16="http://schemas.microsoft.com/office/drawing/2014/main" id="{CCEAD134-E1E8-4B32-A271-8CF5EB8F010B}"/>
               </a:ext>
             </a:extLst>
           </p:cNvPr>
@@ -5114,18 +4957,15 @@
         </p:nvSpPr>
         <p:spPr>
           <a:xfrm>
-            <a:off x="3951405" y="3056261"/>
-            <a:ext cx="676405" cy="676406"/>
-          </a:xfrm>
-          <a:prstGeom prst="flowChartConnector">
-            <a:avLst/>
-          </a:prstGeom>
-          <a:noFill/>
-          <a:ln w="19050">
-            <a:solidFill>
-              <a:srgbClr val="002060"/>
-            </a:solidFill>
-          </a:ln>
+            <a:off x="8186093" y="3097989"/>
+            <a:ext cx="1820366" cy="307777"/>
+          </a:xfrm>
+          <a:prstGeom prst="snip1Rect">
+            <a:avLst/>
+          </a:prstGeom>
+          <a:solidFill>
+            <a:srgbClr val="002060"/>
+          </a:solidFill>
         </p:spPr>
         <p:style>
           <a:lnRef idx="2">
@@ -5148,6 +4988,110 @@
           <a:lstStyle/>
           <a:p>
             <a:pPr algn="ctr"/>
+            <a:endParaRPr lang="pt-BR"/>
+          </a:p>
+        </p:txBody>
+      </p:sp>
+      <p:sp>
+        <p:nvSpPr>
+          <p:cNvPr id="32" name="CaixaDeTexto 31">
+            <a:extLst>
+              <a:ext uri="{FF2B5EF4-FFF2-40B4-BE49-F238E27FC236}">
+                <a16:creationId xmlns:a16="http://schemas.microsoft.com/office/drawing/2014/main" id="{6DBEF09E-B0C5-4EC7-B950-6E002034B9B2}"/>
+              </a:ext>
+            </a:extLst>
+          </p:cNvPr>
+          <p:cNvSpPr txBox="1"/>
+          <p:nvPr/>
+        </p:nvSpPr>
+        <p:spPr>
+          <a:xfrm>
+            <a:off x="8186093" y="3097988"/>
+            <a:ext cx="1958152" cy="307777"/>
+          </a:xfrm>
+          <a:prstGeom prst="rect">
+            <a:avLst/>
+          </a:prstGeom>
+          <a:noFill/>
+        </p:spPr>
+        <p:txBody>
+          <a:bodyPr wrap="square" rtlCol="0">
+            <a:spAutoFit/>
+          </a:bodyPr>
+          <a:lstStyle/>
+          <a:p>
+            <a:r>
+              <a:rPr lang="pt-BR" sz="1400" dirty="0" err="1">
+                <a:solidFill>
+                  <a:schemeClr val="bg1">
+                    <a:lumMod val="85000"/>
+                  </a:schemeClr>
+                </a:solidFill>
+                <a:latin typeface="Biome" panose="020B0502040204020203" pitchFamily="34" charset="0"/>
+                <a:cs typeface="Biome" panose="020B0502040204020203" pitchFamily="34" charset="0"/>
+              </a:rPr>
+              <a:t>TK_Char_Sequence</a:t>
+            </a:r>
+            <a:endParaRPr lang="pt-BR" sz="1400" dirty="0">
+              <a:solidFill>
+                <a:schemeClr val="bg1">
+                  <a:lumMod val="85000"/>
+                </a:schemeClr>
+              </a:solidFill>
+              <a:latin typeface="Biome" panose="020B0502040204020203" pitchFamily="34" charset="0"/>
+              <a:cs typeface="Biome" panose="020B0502040204020203" pitchFamily="34" charset="0"/>
+            </a:endParaRPr>
+          </a:p>
+        </p:txBody>
+      </p:sp>
+      <p:sp>
+        <p:nvSpPr>
+          <p:cNvPr id="4" name="Fluxograma: Conector 3">
+            <a:extLst>
+              <a:ext uri="{FF2B5EF4-FFF2-40B4-BE49-F238E27FC236}">
+                <a16:creationId xmlns:a16="http://schemas.microsoft.com/office/drawing/2014/main" id="{3272DDE6-AD5A-4207-86D4-5FD36093EB43}"/>
+              </a:ext>
+            </a:extLst>
+          </p:cNvPr>
+          <p:cNvSpPr/>
+          <p:nvPr/>
+        </p:nvSpPr>
+        <p:spPr>
+          <a:xfrm>
+            <a:off x="2360616" y="3101423"/>
+            <a:ext cx="676405" cy="676406"/>
+          </a:xfrm>
+          <a:prstGeom prst="flowChartConnector">
+            <a:avLst/>
+          </a:prstGeom>
+          <a:noFill/>
+          <a:ln w="19050">
+            <a:solidFill>
+              <a:srgbClr val="002060"/>
+            </a:solidFill>
+          </a:ln>
+        </p:spPr>
+        <p:style>
+          <a:lnRef idx="2">
+            <a:schemeClr val="accent1">
+              <a:shade val="50000"/>
+            </a:schemeClr>
+          </a:lnRef>
+          <a:fillRef idx="1">
+            <a:schemeClr val="accent1"/>
+          </a:fillRef>
+          <a:effectRef idx="0">
+            <a:schemeClr val="accent1"/>
+          </a:effectRef>
+          <a:fontRef idx="minor">
+            <a:schemeClr val="lt1"/>
+          </a:fontRef>
+        </p:style>
+        <p:txBody>
+          <a:bodyPr rtlCol="0" anchor="ctr"/>
+          <a:lstStyle/>
+          <a:p>
+            <a:pPr algn="ctr"/>
             <a:r>
               <a:rPr lang="pt-BR" dirty="0">
                 <a:ln w="0"/>
@@ -5174,14 +5118,14 @@
           <p:cNvCxnSpPr>
             <a:cxnSpLocks/>
             <a:stCxn id="4" idx="6"/>
-            <a:endCxn id="31" idx="2"/>
+            <a:endCxn id="21" idx="2"/>
           </p:cNvCxnSpPr>
           <p:nvPr/>
         </p:nvCxnSpPr>
         <p:spPr>
           <a:xfrm flipV="1">
-            <a:off x="4627810" y="3383838"/>
-            <a:ext cx="2884560" cy="10626"/>
+            <a:off x="3037021" y="3429000"/>
+            <a:ext cx="2017832" cy="10626"/>
           </a:xfrm>
           <a:prstGeom prst="straightConnector1">
             <a:avLst/>
@@ -5222,7 +5166,7 @@
         </p:nvSpPr>
         <p:spPr>
           <a:xfrm>
-            <a:off x="3801809" y="2718058"/>
+            <a:off x="2211020" y="2763220"/>
             <a:ext cx="676405" cy="676406"/>
           </a:xfrm>
           <a:prstGeom prst="circularArrow">
@@ -5284,7 +5228,7 @@
         </p:nvSpPr>
         <p:spPr>
           <a:xfrm rot="19939312">
-            <a:off x="3546654" y="2525475"/>
+            <a:off x="1955865" y="2570637"/>
             <a:ext cx="738100" cy="307777"/>
           </a:xfrm>
           <a:prstGeom prst="rect">
@@ -5326,8 +5270,8 @@
         </p:nvSpPr>
         <p:spPr>
           <a:xfrm>
-            <a:off x="3187202" y="408554"/>
-            <a:ext cx="5817618" cy="461665"/>
+            <a:off x="3923783" y="408554"/>
+            <a:ext cx="4344459" cy="461665"/>
           </a:xfrm>
           <a:prstGeom prst="rect">
             <a:avLst/>
@@ -5353,28 +5297,14 @@
                 <a:latin typeface="Biome" panose="020B0503030204020804" pitchFamily="34" charset="0"/>
                 <a:cs typeface="Biome" panose="020B0503030204020804" pitchFamily="34" charset="0"/>
               </a:rPr>
-              <a:t>: </a:t>
+              <a:t>: char </a:t>
             </a:r>
             <a:r>
               <a:rPr lang="pt-BR" sz="2400" dirty="0" err="1">
                 <a:latin typeface="Biome" panose="020B0503030204020804" pitchFamily="34" charset="0"/>
                 <a:cs typeface="Biome" panose="020B0503030204020804" pitchFamily="34" charset="0"/>
               </a:rPr>
-              <a:t>Unrecognizable</a:t>
-            </a:r>
-            <a:r>
-              <a:rPr lang="pt-BR" sz="2400" dirty="0">
-                <a:latin typeface="Biome" panose="020B0503030204020804" pitchFamily="34" charset="0"/>
-                <a:cs typeface="Biome" panose="020B0503030204020804" pitchFamily="34" charset="0"/>
-              </a:rPr>
-              <a:t> </a:t>
-            </a:r>
-            <a:r>
-              <a:rPr lang="pt-BR" sz="2400" dirty="0" err="1">
-                <a:latin typeface="Biome" panose="020B0503030204020804" pitchFamily="34" charset="0"/>
-                <a:cs typeface="Biome" panose="020B0503030204020804" pitchFamily="34" charset="0"/>
-              </a:rPr>
-              <a:t>Symbol</a:t>
+              <a:t>sequence</a:t>
             </a:r>
             <a:endParaRPr lang="pt-BR" sz="2400" dirty="0">
               <a:latin typeface="Biome" panose="020B0503030204020804" pitchFamily="34" charset="0"/>
@@ -5516,55 +5446,10 @@
       </p:sp>
       <p:sp>
         <p:nvSpPr>
-          <p:cNvPr id="38" name="CaixaDeTexto 37">
-            <a:extLst>
-              <a:ext uri="{FF2B5EF4-FFF2-40B4-BE49-F238E27FC236}">
-                <a16:creationId xmlns:a16="http://schemas.microsoft.com/office/drawing/2014/main" id="{521A9C69-B40A-4337-871D-E6168BB79163}"/>
-              </a:ext>
-            </a:extLst>
-          </p:cNvPr>
-          <p:cNvSpPr txBox="1"/>
-          <p:nvPr/>
-        </p:nvSpPr>
-        <p:spPr>
-          <a:xfrm>
-            <a:off x="4777406" y="3045040"/>
-            <a:ext cx="2734964" cy="307777"/>
-          </a:xfrm>
-          <a:prstGeom prst="rect">
-            <a:avLst/>
-          </a:prstGeom>
-          <a:noFill/>
-        </p:spPr>
-        <p:txBody>
-          <a:bodyPr wrap="square" rtlCol="0">
-            <a:spAutoFit/>
-          </a:bodyPr>
-          <a:lstStyle/>
-          <a:p>
-            <a:r>
-              <a:rPr lang="pt-BR" sz="1400" dirty="0" err="1">
-                <a:latin typeface="Biome" panose="020B0502040204020203" pitchFamily="34" charset="0"/>
-                <a:cs typeface="Biome" panose="020B0502040204020203" pitchFamily="34" charset="0"/>
-              </a:rPr>
-              <a:t>isUnrecognizableSymbol</a:t>
-            </a:r>
-            <a:r>
-              <a:rPr lang="pt-BR" sz="1400" dirty="0">
-                <a:latin typeface="Biome" panose="020B0502040204020203" pitchFamily="34" charset="0"/>
-                <a:cs typeface="Biome" panose="020B0502040204020203" pitchFamily="34" charset="0"/>
-              </a:rPr>
-              <a:t>(c)</a:t>
-            </a:r>
-          </a:p>
-        </p:txBody>
-      </p:sp>
-      <p:sp>
-        <p:nvSpPr>
-          <p:cNvPr id="31" name="Fluxograma: Conector 30">
-            <a:extLst>
-              <a:ext uri="{FF2B5EF4-FFF2-40B4-BE49-F238E27FC236}">
-                <a16:creationId xmlns:a16="http://schemas.microsoft.com/office/drawing/2014/main" id="{D5D23B87-A469-407F-AA69-95AE7CF2CA2D}"/>
+          <p:cNvPr id="21" name="Fluxograma: Conector 20">
+            <a:extLst>
+              <a:ext uri="{FF2B5EF4-FFF2-40B4-BE49-F238E27FC236}">
+                <a16:creationId xmlns:a16="http://schemas.microsoft.com/office/drawing/2014/main" id="{8085707A-6CAD-46C5-930A-A779AD578522}"/>
               </a:ext>
             </a:extLst>
           </p:cNvPr>
@@ -5573,7 +5458,7 @@
         </p:nvSpPr>
         <p:spPr>
           <a:xfrm>
-            <a:off x="7512370" y="3045635"/>
+            <a:off x="5054853" y="3090797"/>
             <a:ext cx="676405" cy="676406"/>
           </a:xfrm>
           <a:prstGeom prst="flowChartConnector">
@@ -5582,7 +5467,7 @@
           <a:noFill/>
           <a:ln w="19050">
             <a:solidFill>
-              <a:srgbClr val="C00000"/>
+              <a:srgbClr val="002060"/>
             </a:solidFill>
           </a:ln>
         </p:spPr>
@@ -5608,6 +5493,286 @@
           <a:p>
             <a:pPr algn="ctr"/>
             <a:r>
+              <a:rPr lang="pt-BR" sz="1600" dirty="0">
+                <a:ln w="0"/>
+                <a:solidFill>
+                  <a:schemeClr val="tx1"/>
+                </a:solidFill>
+                <a:latin typeface="Biome" panose="020B0503030204020804" pitchFamily="34" charset="0"/>
+                <a:cs typeface="Biome" panose="020B0503030204020804" pitchFamily="34" charset="0"/>
+              </a:rPr>
+              <a:t>19</a:t>
+            </a:r>
+          </a:p>
+        </p:txBody>
+      </p:sp>
+      <p:cxnSp>
+        <p:nvCxnSpPr>
+          <p:cNvPr id="24" name="Conector de Seta Reta 23">
+            <a:extLst>
+              <a:ext uri="{FF2B5EF4-FFF2-40B4-BE49-F238E27FC236}">
+                <a16:creationId xmlns:a16="http://schemas.microsoft.com/office/drawing/2014/main" id="{ADBA826C-D64E-4F39-825E-24C8693FA8B1}"/>
+              </a:ext>
+            </a:extLst>
+          </p:cNvPr>
+          <p:cNvCxnSpPr>
+            <a:cxnSpLocks/>
+            <a:stCxn id="21" idx="6"/>
+          </p:cNvCxnSpPr>
+          <p:nvPr/>
+        </p:nvCxnSpPr>
+        <p:spPr>
+          <a:xfrm flipV="1">
+            <a:off x="5731258" y="3315165"/>
+            <a:ext cx="1699336" cy="113835"/>
+          </a:xfrm>
+          <a:prstGeom prst="straightConnector1">
+            <a:avLst/>
+          </a:prstGeom>
+          <a:ln w="19050">
+            <a:solidFill>
+              <a:srgbClr val="002060"/>
+            </a:solidFill>
+            <a:tailEnd type="triangle"/>
+          </a:ln>
+        </p:spPr>
+        <p:style>
+          <a:lnRef idx="1">
+            <a:schemeClr val="accent1"/>
+          </a:lnRef>
+          <a:fillRef idx="0">
+            <a:schemeClr val="accent1"/>
+          </a:fillRef>
+          <a:effectRef idx="0">
+            <a:schemeClr val="accent1"/>
+          </a:effectRef>
+          <a:fontRef idx="minor">
+            <a:schemeClr val="tx1"/>
+          </a:fontRef>
+        </p:style>
+      </p:cxnSp>
+      <p:cxnSp>
+        <p:nvCxnSpPr>
+          <p:cNvPr id="22" name="Conector de Seta Reta 21">
+            <a:extLst>
+              <a:ext uri="{FF2B5EF4-FFF2-40B4-BE49-F238E27FC236}">
+                <a16:creationId xmlns:a16="http://schemas.microsoft.com/office/drawing/2014/main" id="{99F15100-5560-49E5-8208-A099E7044DB5}"/>
+              </a:ext>
+            </a:extLst>
+          </p:cNvPr>
+          <p:cNvCxnSpPr>
+            <a:cxnSpLocks/>
+            <a:stCxn id="21" idx="5"/>
+          </p:cNvCxnSpPr>
+          <p:nvPr/>
+        </p:nvCxnSpPr>
+        <p:spPr>
+          <a:xfrm>
+            <a:off x="5632201" y="3668146"/>
+            <a:ext cx="689420" cy="1035782"/>
+          </a:xfrm>
+          <a:prstGeom prst="straightConnector1">
+            <a:avLst/>
+          </a:prstGeom>
+          <a:ln w="19050">
+            <a:solidFill>
+              <a:srgbClr val="002060"/>
+            </a:solidFill>
+            <a:tailEnd type="triangle"/>
+          </a:ln>
+        </p:spPr>
+        <p:style>
+          <a:lnRef idx="1">
+            <a:schemeClr val="accent1"/>
+          </a:lnRef>
+          <a:fillRef idx="0">
+            <a:schemeClr val="accent1"/>
+          </a:fillRef>
+          <a:effectRef idx="0">
+            <a:schemeClr val="accent1"/>
+          </a:effectRef>
+          <a:fontRef idx="minor">
+            <a:schemeClr val="tx1"/>
+          </a:fontRef>
+        </p:style>
+      </p:cxnSp>
+      <p:sp>
+        <p:nvSpPr>
+          <p:cNvPr id="25" name="CaixaDeTexto 24">
+            <a:extLst>
+              <a:ext uri="{FF2B5EF4-FFF2-40B4-BE49-F238E27FC236}">
+                <a16:creationId xmlns:a16="http://schemas.microsoft.com/office/drawing/2014/main" id="{242EFDF6-EACA-48A1-B26A-2D8EB9AC8CD8}"/>
+              </a:ext>
+            </a:extLst>
+          </p:cNvPr>
+          <p:cNvSpPr txBox="1"/>
+          <p:nvPr/>
+        </p:nvSpPr>
+        <p:spPr>
+          <a:xfrm rot="3172126">
+            <a:off x="5893040" y="3911367"/>
+            <a:ext cx="381497" cy="307777"/>
+          </a:xfrm>
+          <a:prstGeom prst="rect">
+            <a:avLst/>
+          </a:prstGeom>
+          <a:noFill/>
+        </p:spPr>
+        <p:txBody>
+          <a:bodyPr wrap="square" rtlCol="0">
+            <a:spAutoFit/>
+          </a:bodyPr>
+          <a:lstStyle/>
+          <a:p>
+            <a:r>
+              <a:rPr lang="pt-BR" sz="1400" dirty="0">
+                <a:latin typeface="Biome" panose="020B0502040204020203" pitchFamily="34" charset="0"/>
+                <a:cs typeface="Biome" panose="020B0502040204020203" pitchFamily="34" charset="0"/>
+              </a:rPr>
+              <a:t>\n</a:t>
+            </a:r>
+          </a:p>
+        </p:txBody>
+      </p:sp>
+      <p:sp>
+        <p:nvSpPr>
+          <p:cNvPr id="38" name="CaixaDeTexto 37">
+            <a:extLst>
+              <a:ext uri="{FF2B5EF4-FFF2-40B4-BE49-F238E27FC236}">
+                <a16:creationId xmlns:a16="http://schemas.microsoft.com/office/drawing/2014/main" id="{521A9C69-B40A-4337-871D-E6168BB79163}"/>
+              </a:ext>
+            </a:extLst>
+          </p:cNvPr>
+          <p:cNvSpPr txBox="1"/>
+          <p:nvPr/>
+        </p:nvSpPr>
+        <p:spPr>
+          <a:xfrm>
+            <a:off x="3258399" y="3122710"/>
+            <a:ext cx="1853232" cy="307777"/>
+          </a:xfrm>
+          <a:prstGeom prst="rect">
+            <a:avLst/>
+          </a:prstGeom>
+          <a:noFill/>
+        </p:spPr>
+        <p:txBody>
+          <a:bodyPr wrap="square" rtlCol="0">
+            <a:spAutoFit/>
+          </a:bodyPr>
+          <a:lstStyle/>
+          <a:p>
+            <a:r>
+              <a:rPr lang="pt-BR" sz="1400" dirty="0" err="1">
+                <a:latin typeface="Biome" panose="020B0502040204020203" pitchFamily="34" charset="0"/>
+                <a:cs typeface="Biome" panose="020B0502040204020203" pitchFamily="34" charset="0"/>
+              </a:rPr>
+              <a:t>isDoubleQuotes</a:t>
+            </a:r>
+            <a:r>
+              <a:rPr lang="pt-BR" sz="1400" dirty="0">
+                <a:latin typeface="Biome" panose="020B0502040204020203" pitchFamily="34" charset="0"/>
+                <a:cs typeface="Biome" panose="020B0502040204020203" pitchFamily="34" charset="0"/>
+              </a:rPr>
+              <a:t>(c)</a:t>
+            </a:r>
+          </a:p>
+        </p:txBody>
+      </p:sp>
+      <p:sp>
+        <p:nvSpPr>
+          <p:cNvPr id="34" name="CaixaDeTexto 33">
+            <a:extLst>
+              <a:ext uri="{FF2B5EF4-FFF2-40B4-BE49-F238E27FC236}">
+                <a16:creationId xmlns:a16="http://schemas.microsoft.com/office/drawing/2014/main" id="{EC2A4912-DBAF-4BB4-893B-601A84034174}"/>
+              </a:ext>
+            </a:extLst>
+          </p:cNvPr>
+          <p:cNvSpPr txBox="1"/>
+          <p:nvPr/>
+        </p:nvSpPr>
+        <p:spPr>
+          <a:xfrm rot="21316746">
+            <a:off x="5722246" y="3035101"/>
+            <a:ext cx="1853232" cy="307777"/>
+          </a:xfrm>
+          <a:prstGeom prst="rect">
+            <a:avLst/>
+          </a:prstGeom>
+          <a:noFill/>
+        </p:spPr>
+        <p:txBody>
+          <a:bodyPr wrap="square" rtlCol="0">
+            <a:spAutoFit/>
+          </a:bodyPr>
+          <a:lstStyle/>
+          <a:p>
+            <a:r>
+              <a:rPr lang="pt-BR" sz="1400" dirty="0" err="1">
+                <a:latin typeface="Biome" panose="020B0502040204020203" pitchFamily="34" charset="0"/>
+                <a:cs typeface="Biome" panose="020B0502040204020203" pitchFamily="34" charset="0"/>
+              </a:rPr>
+              <a:t>isDoubleQuotes</a:t>
+            </a:r>
+            <a:r>
+              <a:rPr lang="pt-BR" sz="1400" dirty="0">
+                <a:latin typeface="Biome" panose="020B0502040204020203" pitchFamily="34" charset="0"/>
+                <a:cs typeface="Biome" panose="020B0502040204020203" pitchFamily="34" charset="0"/>
+              </a:rPr>
+              <a:t>(c)</a:t>
+            </a:r>
+          </a:p>
+        </p:txBody>
+      </p:sp>
+      <p:sp>
+        <p:nvSpPr>
+          <p:cNvPr id="36" name="Fluxograma: Conector 35">
+            <a:extLst>
+              <a:ext uri="{FF2B5EF4-FFF2-40B4-BE49-F238E27FC236}">
+                <a16:creationId xmlns:a16="http://schemas.microsoft.com/office/drawing/2014/main" id="{5E5A5F35-E7A2-4C07-90BC-0810E44BA054}"/>
+              </a:ext>
+            </a:extLst>
+          </p:cNvPr>
+          <p:cNvSpPr/>
+          <p:nvPr/>
+        </p:nvSpPr>
+        <p:spPr>
+          <a:xfrm>
+            <a:off x="6195229" y="4604871"/>
+            <a:ext cx="676405" cy="676406"/>
+          </a:xfrm>
+          <a:prstGeom prst="flowChartConnector">
+            <a:avLst/>
+          </a:prstGeom>
+          <a:noFill/>
+          <a:ln w="19050">
+            <a:solidFill>
+              <a:srgbClr val="C00000"/>
+            </a:solidFill>
+          </a:ln>
+        </p:spPr>
+        <p:style>
+          <a:lnRef idx="2">
+            <a:schemeClr val="accent1">
+              <a:shade val="50000"/>
+            </a:schemeClr>
+          </a:lnRef>
+          <a:fillRef idx="1">
+            <a:schemeClr val="accent1"/>
+          </a:fillRef>
+          <a:effectRef idx="0">
+            <a:schemeClr val="accent1"/>
+          </a:effectRef>
+          <a:fontRef idx="minor">
+            <a:schemeClr val="lt1"/>
+          </a:fontRef>
+        </p:style>
+        <p:txBody>
+          <a:bodyPr rtlCol="0" anchor="ctr"/>
+          <a:lstStyle/>
+          <a:p>
+            <a:pPr algn="ctr"/>
+            <a:r>
               <a:rPr lang="pt-BR" sz="1200" dirty="0">
                 <a:ln w="0"/>
                 <a:solidFill>
@@ -5616,15 +5781,182 @@
                 <a:latin typeface="Biome" panose="020B0503030204020804" pitchFamily="34" charset="0"/>
                 <a:cs typeface="Biome" panose="020B0503030204020804" pitchFamily="34" charset="0"/>
               </a:rPr>
-              <a:t>Ex7</a:t>
-            </a:r>
+              <a:t>Ex5</a:t>
+            </a:r>
+          </a:p>
+        </p:txBody>
+      </p:sp>
+      <p:sp>
+        <p:nvSpPr>
+          <p:cNvPr id="46" name="CaixaDeTexto 45">
+            <a:extLst>
+              <a:ext uri="{FF2B5EF4-FFF2-40B4-BE49-F238E27FC236}">
+                <a16:creationId xmlns:a16="http://schemas.microsoft.com/office/drawing/2014/main" id="{D5D35B9A-F6C5-42E8-85E9-864429FF219E}"/>
+              </a:ext>
+            </a:extLst>
+          </p:cNvPr>
+          <p:cNvSpPr txBox="1"/>
+          <p:nvPr/>
+        </p:nvSpPr>
+        <p:spPr>
+          <a:xfrm rot="21332382">
+            <a:off x="4908517" y="2412515"/>
+            <a:ext cx="796604" cy="307777"/>
+          </a:xfrm>
+          <a:prstGeom prst="rect">
+            <a:avLst/>
+          </a:prstGeom>
+          <a:noFill/>
+        </p:spPr>
+        <p:txBody>
+          <a:bodyPr wrap="square" rtlCol="0">
+            <a:spAutoFit/>
+          </a:bodyPr>
+          <a:lstStyle/>
+          <a:p>
+            <a:r>
+              <a:rPr lang="pt-BR" sz="1400" dirty="0" err="1">
+                <a:latin typeface="Biome" panose="020B0502040204020203" pitchFamily="34" charset="0"/>
+                <a:cs typeface="Biome" panose="020B0502040204020203" pitchFamily="34" charset="0"/>
+              </a:rPr>
+              <a:t>other</a:t>
+            </a:r>
+            <a:endParaRPr lang="pt-BR" sz="1400" dirty="0">
+              <a:latin typeface="Biome" panose="020B0502040204020203" pitchFamily="34" charset="0"/>
+              <a:cs typeface="Biome" panose="020B0502040204020203" pitchFamily="34" charset="0"/>
+            </a:endParaRPr>
+          </a:p>
+        </p:txBody>
+      </p:sp>
+      <p:sp>
+        <p:nvSpPr>
+          <p:cNvPr id="33" name="Círculo: Vazio 32">
+            <a:extLst>
+              <a:ext uri="{FF2B5EF4-FFF2-40B4-BE49-F238E27FC236}">
+                <a16:creationId xmlns:a16="http://schemas.microsoft.com/office/drawing/2014/main" id="{DEC98BB9-6AA7-4D90-9210-A0A6123BEC44}"/>
+              </a:ext>
+            </a:extLst>
+          </p:cNvPr>
+          <p:cNvSpPr/>
+          <p:nvPr/>
+        </p:nvSpPr>
+        <p:spPr>
+          <a:xfrm>
+            <a:off x="7430594" y="2927166"/>
+            <a:ext cx="676405" cy="676406"/>
+          </a:xfrm>
+          <a:prstGeom prst="donut">
+            <a:avLst>
+              <a:gd name="adj" fmla="val 9980"/>
+            </a:avLst>
+          </a:prstGeom>
+          <a:noFill/>
+          <a:ln w="19050">
+            <a:solidFill>
+              <a:srgbClr val="002060"/>
+            </a:solidFill>
+          </a:ln>
+        </p:spPr>
+        <p:style>
+          <a:lnRef idx="2">
+            <a:schemeClr val="accent1">
+              <a:shade val="50000"/>
+            </a:schemeClr>
+          </a:lnRef>
+          <a:fillRef idx="1">
+            <a:schemeClr val="accent1"/>
+          </a:fillRef>
+          <a:effectRef idx="0">
+            <a:schemeClr val="accent1"/>
+          </a:effectRef>
+          <a:fontRef idx="minor">
+            <a:schemeClr val="lt1"/>
+          </a:fontRef>
+        </p:style>
+        <p:txBody>
+          <a:bodyPr rtlCol="0" anchor="ctr"/>
+          <a:lstStyle/>
+          <a:p>
+            <a:pPr algn="ctr"/>
+            <a:r>
+              <a:rPr lang="pt-BR" dirty="0">
+                <a:solidFill>
+                  <a:schemeClr val="tx1"/>
+                </a:solidFill>
+                <a:latin typeface="Biome" panose="020B0503030204020804" pitchFamily="34" charset="0"/>
+                <a:cs typeface="Biome" panose="020B0503030204020804" pitchFamily="34" charset="0"/>
+              </a:rPr>
+              <a:t>R</a:t>
+            </a:r>
+          </a:p>
+        </p:txBody>
+      </p:sp>
+      <p:sp>
+        <p:nvSpPr>
+          <p:cNvPr id="40" name="Seta: Circular 39">
+            <a:extLst>
+              <a:ext uri="{FF2B5EF4-FFF2-40B4-BE49-F238E27FC236}">
+                <a16:creationId xmlns:a16="http://schemas.microsoft.com/office/drawing/2014/main" id="{9ED255A9-38CE-4408-904A-7E1529F03991}"/>
+              </a:ext>
+            </a:extLst>
+          </p:cNvPr>
+          <p:cNvSpPr/>
+          <p:nvPr/>
+        </p:nvSpPr>
+        <p:spPr>
+          <a:xfrm>
+            <a:off x="4890645" y="2715719"/>
+            <a:ext cx="676405" cy="676406"/>
+          </a:xfrm>
+          <a:prstGeom prst="circularArrow">
+            <a:avLst>
+              <a:gd name="adj1" fmla="val 1466"/>
+              <a:gd name="adj2" fmla="val 828081"/>
+              <a:gd name="adj3" fmla="val 20941615"/>
+              <a:gd name="adj4" fmla="val 7668068"/>
+              <a:gd name="adj5" fmla="val 8877"/>
+            </a:avLst>
+          </a:prstGeom>
+          <a:noFill/>
+          <a:ln>
+            <a:solidFill>
+              <a:srgbClr val="002060"/>
+            </a:solidFill>
+          </a:ln>
+        </p:spPr>
+        <p:style>
+          <a:lnRef idx="2">
+            <a:schemeClr val="accent1">
+              <a:shade val="50000"/>
+            </a:schemeClr>
+          </a:lnRef>
+          <a:fillRef idx="1">
+            <a:schemeClr val="accent1"/>
+          </a:fillRef>
+          <a:effectRef idx="0">
+            <a:schemeClr val="accent1"/>
+          </a:effectRef>
+          <a:fontRef idx="minor">
+            <a:schemeClr val="lt1"/>
+          </a:fontRef>
+        </p:style>
+        <p:txBody>
+          <a:bodyPr rtlCol="0" anchor="ctr"/>
+          <a:lstStyle/>
+          <a:p>
+            <a:pPr algn="ctr"/>
+            <a:endParaRPr lang="pt-BR">
+              <a:solidFill>
+                <a:schemeClr val="tx1"/>
+              </a:solidFill>
+            </a:endParaRPr>
           </a:p>
         </p:txBody>
       </p:sp>
     </p:spTree>
     <p:extLst>
       <p:ext uri="{BB962C8B-B14F-4D97-AF65-F5344CB8AC3E}">
-        <p14:creationId xmlns:p14="http://schemas.microsoft.com/office/powerpoint/2010/main" val="2307997535"/>
+        <p14:creationId xmlns:p14="http://schemas.microsoft.com/office/powerpoint/2010/main" val="2700234638"/>
       </p:ext>
     </p:extLst>
   </p:cSld>
@@ -5665,6 +5997,218 @@
       </p:grpSpPr>
       <p:sp>
         <p:nvSpPr>
+          <p:cNvPr id="4" name="Fluxograma: Conector 3">
+            <a:extLst>
+              <a:ext uri="{FF2B5EF4-FFF2-40B4-BE49-F238E27FC236}">
+                <a16:creationId xmlns:a16="http://schemas.microsoft.com/office/drawing/2014/main" id="{3272DDE6-AD5A-4207-86D4-5FD36093EB43}"/>
+              </a:ext>
+            </a:extLst>
+          </p:cNvPr>
+          <p:cNvSpPr/>
+          <p:nvPr/>
+        </p:nvSpPr>
+        <p:spPr>
+          <a:xfrm>
+            <a:off x="3951405" y="3056261"/>
+            <a:ext cx="676405" cy="676406"/>
+          </a:xfrm>
+          <a:prstGeom prst="flowChartConnector">
+            <a:avLst/>
+          </a:prstGeom>
+          <a:noFill/>
+          <a:ln w="19050">
+            <a:solidFill>
+              <a:srgbClr val="002060"/>
+            </a:solidFill>
+          </a:ln>
+        </p:spPr>
+        <p:style>
+          <a:lnRef idx="2">
+            <a:schemeClr val="accent1">
+              <a:shade val="50000"/>
+            </a:schemeClr>
+          </a:lnRef>
+          <a:fillRef idx="1">
+            <a:schemeClr val="accent1"/>
+          </a:fillRef>
+          <a:effectRef idx="0">
+            <a:schemeClr val="accent1"/>
+          </a:effectRef>
+          <a:fontRef idx="minor">
+            <a:schemeClr val="lt1"/>
+          </a:fontRef>
+        </p:style>
+        <p:txBody>
+          <a:bodyPr rtlCol="0" anchor="ctr"/>
+          <a:lstStyle/>
+          <a:p>
+            <a:pPr algn="ctr"/>
+            <a:r>
+              <a:rPr lang="pt-BR" dirty="0">
+                <a:ln w="0"/>
+                <a:solidFill>
+                  <a:schemeClr val="tx1"/>
+                </a:solidFill>
+                <a:latin typeface="Biome" panose="020B0503030204020804" pitchFamily="34" charset="0"/>
+                <a:cs typeface="Biome" panose="020B0503030204020804" pitchFamily="34" charset="0"/>
+              </a:rPr>
+              <a:t>0</a:t>
+            </a:r>
+          </a:p>
+        </p:txBody>
+      </p:sp>
+      <p:cxnSp>
+        <p:nvCxnSpPr>
+          <p:cNvPr id="9" name="Conector de Seta Reta 8">
+            <a:extLst>
+              <a:ext uri="{FF2B5EF4-FFF2-40B4-BE49-F238E27FC236}">
+                <a16:creationId xmlns:a16="http://schemas.microsoft.com/office/drawing/2014/main" id="{D2A2D81A-7AB6-4675-9900-C1EEF7C703EE}"/>
+              </a:ext>
+            </a:extLst>
+          </p:cNvPr>
+          <p:cNvCxnSpPr>
+            <a:cxnSpLocks/>
+            <a:stCxn id="4" idx="6"/>
+            <a:endCxn id="31" idx="2"/>
+          </p:cNvCxnSpPr>
+          <p:nvPr/>
+        </p:nvCxnSpPr>
+        <p:spPr>
+          <a:xfrm flipV="1">
+            <a:off x="4627810" y="3383838"/>
+            <a:ext cx="2884560" cy="10626"/>
+          </a:xfrm>
+          <a:prstGeom prst="straightConnector1">
+            <a:avLst/>
+          </a:prstGeom>
+          <a:ln w="19050">
+            <a:solidFill>
+              <a:srgbClr val="002060"/>
+            </a:solidFill>
+            <a:tailEnd type="triangle"/>
+          </a:ln>
+        </p:spPr>
+        <p:style>
+          <a:lnRef idx="1">
+            <a:schemeClr val="accent1"/>
+          </a:lnRef>
+          <a:fillRef idx="0">
+            <a:schemeClr val="accent1"/>
+          </a:fillRef>
+          <a:effectRef idx="0">
+            <a:schemeClr val="accent1"/>
+          </a:effectRef>
+          <a:fontRef idx="minor">
+            <a:schemeClr val="tx1"/>
+          </a:fontRef>
+        </p:style>
+      </p:cxnSp>
+      <p:sp>
+        <p:nvSpPr>
+          <p:cNvPr id="18" name="Seta: Circular 17">
+            <a:extLst>
+              <a:ext uri="{FF2B5EF4-FFF2-40B4-BE49-F238E27FC236}">
+                <a16:creationId xmlns:a16="http://schemas.microsoft.com/office/drawing/2014/main" id="{364652BC-79CA-4267-9ED7-E361A17A0443}"/>
+              </a:ext>
+            </a:extLst>
+          </p:cNvPr>
+          <p:cNvSpPr/>
+          <p:nvPr/>
+        </p:nvSpPr>
+        <p:spPr>
+          <a:xfrm>
+            <a:off x="3801809" y="2718058"/>
+            <a:ext cx="676405" cy="676406"/>
+          </a:xfrm>
+          <a:prstGeom prst="circularArrow">
+            <a:avLst>
+              <a:gd name="adj1" fmla="val 1466"/>
+              <a:gd name="adj2" fmla="val 828081"/>
+              <a:gd name="adj3" fmla="val 20941615"/>
+              <a:gd name="adj4" fmla="val 7668068"/>
+              <a:gd name="adj5" fmla="val 8877"/>
+            </a:avLst>
+          </a:prstGeom>
+          <a:noFill/>
+          <a:ln>
+            <a:solidFill>
+              <a:srgbClr val="002060"/>
+            </a:solidFill>
+          </a:ln>
+        </p:spPr>
+        <p:style>
+          <a:lnRef idx="2">
+            <a:schemeClr val="accent1">
+              <a:shade val="50000"/>
+            </a:schemeClr>
+          </a:lnRef>
+          <a:fillRef idx="1">
+            <a:schemeClr val="accent1"/>
+          </a:fillRef>
+          <a:effectRef idx="0">
+            <a:schemeClr val="accent1"/>
+          </a:effectRef>
+          <a:fontRef idx="minor">
+            <a:schemeClr val="lt1"/>
+          </a:fontRef>
+        </p:style>
+        <p:txBody>
+          <a:bodyPr rtlCol="0" anchor="ctr"/>
+          <a:lstStyle/>
+          <a:p>
+            <a:pPr algn="ctr"/>
+            <a:endParaRPr lang="pt-BR">
+              <a:solidFill>
+                <a:schemeClr val="tx1"/>
+              </a:solidFill>
+            </a:endParaRPr>
+          </a:p>
+        </p:txBody>
+      </p:sp>
+      <p:sp>
+        <p:nvSpPr>
+          <p:cNvPr id="42" name="CaixaDeTexto 41">
+            <a:extLst>
+              <a:ext uri="{FF2B5EF4-FFF2-40B4-BE49-F238E27FC236}">
+                <a16:creationId xmlns:a16="http://schemas.microsoft.com/office/drawing/2014/main" id="{4CF31268-74EF-49AA-8A9C-48FFAF98CCF9}"/>
+              </a:ext>
+            </a:extLst>
+          </p:cNvPr>
+          <p:cNvSpPr txBox="1"/>
+          <p:nvPr/>
+        </p:nvSpPr>
+        <p:spPr>
+          <a:xfrm rot="19939312">
+            <a:off x="3546654" y="2525475"/>
+            <a:ext cx="738100" cy="307777"/>
+          </a:xfrm>
+          <a:prstGeom prst="rect">
+            <a:avLst/>
+          </a:prstGeom>
+          <a:noFill/>
+        </p:spPr>
+        <p:txBody>
+          <a:bodyPr wrap="square" rtlCol="0">
+            <a:spAutoFit/>
+          </a:bodyPr>
+          <a:lstStyle/>
+          <a:p>
+            <a:r>
+              <a:rPr lang="pt-BR" sz="1400" dirty="0" err="1">
+                <a:latin typeface="Biome" panose="020B0502040204020203" pitchFamily="34" charset="0"/>
+                <a:cs typeface="Biome" panose="020B0502040204020203" pitchFamily="34" charset="0"/>
+              </a:rPr>
+              <a:t>space</a:t>
+            </a:r>
+            <a:endParaRPr lang="pt-BR" sz="1400" dirty="0">
+              <a:latin typeface="Biome" panose="020B0502040204020203" pitchFamily="34" charset="0"/>
+              <a:cs typeface="Biome" panose="020B0502040204020203" pitchFamily="34" charset="0"/>
+            </a:endParaRPr>
+          </a:p>
+        </p:txBody>
+      </p:sp>
+      <p:sp>
+        <p:nvSpPr>
           <p:cNvPr id="78" name="CaixaDeTexto 77">
             <a:extLst>
               <a:ext uri="{FF2B5EF4-FFF2-40B4-BE49-F238E27FC236}">
@@ -5677,8 +6221,8 @@
         </p:nvSpPr>
         <p:spPr>
           <a:xfrm>
-            <a:off x="5150883" y="408554"/>
-            <a:ext cx="1890262" cy="461665"/>
+            <a:off x="3187202" y="408554"/>
+            <a:ext cx="5817618" cy="461665"/>
           </a:xfrm>
           <a:prstGeom prst="rect">
             <a:avLst/>
@@ -5697,7 +6241,35 @@
                 <a:latin typeface="Biome" panose="020B0503030204020804" pitchFamily="34" charset="0"/>
                 <a:cs typeface="Biome" panose="020B0503030204020804" pitchFamily="34" charset="0"/>
               </a:rPr>
-              <a:t>Exceptions</a:t>
+              <a:t>Automaton</a:t>
+            </a:r>
+            <a:r>
+              <a:rPr lang="pt-BR" sz="2400" dirty="0">
+                <a:latin typeface="Biome" panose="020B0503030204020804" pitchFamily="34" charset="0"/>
+                <a:cs typeface="Biome" panose="020B0503030204020804" pitchFamily="34" charset="0"/>
+              </a:rPr>
+              <a:t>: </a:t>
+            </a:r>
+            <a:r>
+              <a:rPr lang="pt-BR" sz="2400" dirty="0" err="1">
+                <a:latin typeface="Biome" panose="020B0503030204020804" pitchFamily="34" charset="0"/>
+                <a:cs typeface="Biome" panose="020B0503030204020804" pitchFamily="34" charset="0"/>
+              </a:rPr>
+              <a:t>Unrecognizable</a:t>
+            </a:r>
+            <a:r>
+              <a:rPr lang="pt-BR" sz="2400" dirty="0">
+                <a:latin typeface="Biome" panose="020B0503030204020804" pitchFamily="34" charset="0"/>
+                <a:cs typeface="Biome" panose="020B0503030204020804" pitchFamily="34" charset="0"/>
+              </a:rPr>
+              <a:t> </a:t>
+            </a:r>
+            <a:r>
+              <a:rPr lang="pt-BR" sz="2400" dirty="0" err="1">
+                <a:latin typeface="Biome" panose="020B0503030204020804" pitchFamily="34" charset="0"/>
+                <a:cs typeface="Biome" panose="020B0503030204020804" pitchFamily="34" charset="0"/>
+              </a:rPr>
+              <a:t>Symbol</a:t>
             </a:r>
             <a:endParaRPr lang="pt-BR" sz="2400" dirty="0">
               <a:latin typeface="Biome" panose="020B0503030204020804" pitchFamily="34" charset="0"/>
@@ -5837,6 +6409,329 @@
           </a:p>
         </p:txBody>
       </p:sp>
+      <p:sp>
+        <p:nvSpPr>
+          <p:cNvPr id="38" name="CaixaDeTexto 37">
+            <a:extLst>
+              <a:ext uri="{FF2B5EF4-FFF2-40B4-BE49-F238E27FC236}">
+                <a16:creationId xmlns:a16="http://schemas.microsoft.com/office/drawing/2014/main" id="{521A9C69-B40A-4337-871D-E6168BB79163}"/>
+              </a:ext>
+            </a:extLst>
+          </p:cNvPr>
+          <p:cNvSpPr txBox="1"/>
+          <p:nvPr/>
+        </p:nvSpPr>
+        <p:spPr>
+          <a:xfrm>
+            <a:off x="4777406" y="3045040"/>
+            <a:ext cx="2734964" cy="307777"/>
+          </a:xfrm>
+          <a:prstGeom prst="rect">
+            <a:avLst/>
+          </a:prstGeom>
+          <a:noFill/>
+        </p:spPr>
+        <p:txBody>
+          <a:bodyPr wrap="square" rtlCol="0">
+            <a:spAutoFit/>
+          </a:bodyPr>
+          <a:lstStyle/>
+          <a:p>
+            <a:r>
+              <a:rPr lang="pt-BR" sz="1400" dirty="0" err="1">
+                <a:latin typeface="Biome" panose="020B0502040204020203" pitchFamily="34" charset="0"/>
+                <a:cs typeface="Biome" panose="020B0502040204020203" pitchFamily="34" charset="0"/>
+              </a:rPr>
+              <a:t>isUnrecognizableSymbol</a:t>
+            </a:r>
+            <a:r>
+              <a:rPr lang="pt-BR" sz="1400" dirty="0">
+                <a:latin typeface="Biome" panose="020B0502040204020203" pitchFamily="34" charset="0"/>
+                <a:cs typeface="Biome" panose="020B0502040204020203" pitchFamily="34" charset="0"/>
+              </a:rPr>
+              <a:t>(c)</a:t>
+            </a:r>
+          </a:p>
+        </p:txBody>
+      </p:sp>
+      <p:sp>
+        <p:nvSpPr>
+          <p:cNvPr id="31" name="Fluxograma: Conector 30">
+            <a:extLst>
+              <a:ext uri="{FF2B5EF4-FFF2-40B4-BE49-F238E27FC236}">
+                <a16:creationId xmlns:a16="http://schemas.microsoft.com/office/drawing/2014/main" id="{D5D23B87-A469-407F-AA69-95AE7CF2CA2D}"/>
+              </a:ext>
+            </a:extLst>
+          </p:cNvPr>
+          <p:cNvSpPr/>
+          <p:nvPr/>
+        </p:nvSpPr>
+        <p:spPr>
+          <a:xfrm>
+            <a:off x="7512370" y="3045635"/>
+            <a:ext cx="676405" cy="676406"/>
+          </a:xfrm>
+          <a:prstGeom prst="flowChartConnector">
+            <a:avLst/>
+          </a:prstGeom>
+          <a:noFill/>
+          <a:ln w="19050">
+            <a:solidFill>
+              <a:srgbClr val="C00000"/>
+            </a:solidFill>
+          </a:ln>
+        </p:spPr>
+        <p:style>
+          <a:lnRef idx="2">
+            <a:schemeClr val="accent1">
+              <a:shade val="50000"/>
+            </a:schemeClr>
+          </a:lnRef>
+          <a:fillRef idx="1">
+            <a:schemeClr val="accent1"/>
+          </a:fillRef>
+          <a:effectRef idx="0">
+            <a:schemeClr val="accent1"/>
+          </a:effectRef>
+          <a:fontRef idx="minor">
+            <a:schemeClr val="lt1"/>
+          </a:fontRef>
+        </p:style>
+        <p:txBody>
+          <a:bodyPr rtlCol="0" anchor="ctr"/>
+          <a:lstStyle/>
+          <a:p>
+            <a:pPr algn="ctr"/>
+            <a:r>
+              <a:rPr lang="pt-BR" sz="1200" dirty="0">
+                <a:ln w="0"/>
+                <a:solidFill>
+                  <a:srgbClr val="C00000"/>
+                </a:solidFill>
+                <a:latin typeface="Biome" panose="020B0503030204020804" pitchFamily="34" charset="0"/>
+                <a:cs typeface="Biome" panose="020B0503030204020804" pitchFamily="34" charset="0"/>
+              </a:rPr>
+              <a:t>Ex7</a:t>
+            </a:r>
+          </a:p>
+        </p:txBody>
+      </p:sp>
+    </p:spTree>
+    <p:extLst>
+      <p:ext uri="{BB962C8B-B14F-4D97-AF65-F5344CB8AC3E}">
+        <p14:creationId xmlns:p14="http://schemas.microsoft.com/office/powerpoint/2010/main" val="2307997535"/>
+      </p:ext>
+    </p:extLst>
+  </p:cSld>
+  <p:clrMapOvr>
+    <a:masterClrMapping/>
+  </p:clrMapOvr>
+  <mc:AlternateContent xmlns:mc="http://schemas.openxmlformats.org/markup-compatibility/2006" xmlns:p14="http://schemas.microsoft.com/office/powerpoint/2010/main">
+    <mc:Choice Requires="p14">
+      <p:transition spd="med" p14:dur="700">
+        <p:fade/>
+      </p:transition>
+    </mc:Choice>
+    <mc:Fallback xmlns="">
+      <p:transition spd="med">
+        <p:fade/>
+      </p:transition>
+    </mc:Fallback>
+  </mc:AlternateContent>
+</p:sld>
+</file>
+
+<file path=ppt/slides/slide13.xml><?xml version="1.0" encoding="utf-8"?>
+<p:sld xmlns:a="http://schemas.openxmlformats.org/drawingml/2006/main" xmlns:r="http://schemas.openxmlformats.org/officeDocument/2006/relationships" xmlns:p="http://schemas.openxmlformats.org/presentationml/2006/main">
+  <p:cSld>
+    <p:spTree>
+      <p:nvGrpSpPr>
+        <p:cNvPr id="1" name=""/>
+        <p:cNvGrpSpPr/>
+        <p:nvPr/>
+      </p:nvGrpSpPr>
+      <p:grpSpPr>
+        <a:xfrm>
+          <a:off x="0" y="0"/>
+          <a:ext cx="0" cy="0"/>
+          <a:chOff x="0" y="0"/>
+          <a:chExt cx="0" cy="0"/>
+        </a:xfrm>
+      </p:grpSpPr>
+      <p:sp>
+        <p:nvSpPr>
+          <p:cNvPr id="78" name="CaixaDeTexto 77">
+            <a:extLst>
+              <a:ext uri="{FF2B5EF4-FFF2-40B4-BE49-F238E27FC236}">
+                <a16:creationId xmlns:a16="http://schemas.microsoft.com/office/drawing/2014/main" id="{F8662209-CC73-4844-98AF-25BAA8574176}"/>
+              </a:ext>
+            </a:extLst>
+          </p:cNvPr>
+          <p:cNvSpPr txBox="1"/>
+          <p:nvPr/>
+        </p:nvSpPr>
+        <p:spPr>
+          <a:xfrm>
+            <a:off x="5150883" y="408554"/>
+            <a:ext cx="1890262" cy="461665"/>
+          </a:xfrm>
+          <a:prstGeom prst="rect">
+            <a:avLst/>
+          </a:prstGeom>
+          <a:noFill/>
+        </p:spPr>
+        <p:txBody>
+          <a:bodyPr wrap="none" rtlCol="0">
+            <a:spAutoFit/>
+          </a:bodyPr>
+          <a:lstStyle/>
+          <a:p>
+            <a:pPr algn="ctr"/>
+            <a:r>
+              <a:rPr lang="pt-BR" sz="2400" dirty="0" err="1">
+                <a:latin typeface="Biome" panose="020B0503030204020804" pitchFamily="34" charset="0"/>
+                <a:cs typeface="Biome" panose="020B0503030204020804" pitchFamily="34" charset="0"/>
+              </a:rPr>
+              <a:t>Exceptions</a:t>
+            </a:r>
+            <a:endParaRPr lang="pt-BR" sz="2400" dirty="0">
+              <a:latin typeface="Biome" panose="020B0503030204020804" pitchFamily="34" charset="0"/>
+              <a:cs typeface="Biome" panose="020B0503030204020804" pitchFamily="34" charset="0"/>
+            </a:endParaRPr>
+          </a:p>
+        </p:txBody>
+      </p:sp>
+      <p:cxnSp>
+        <p:nvCxnSpPr>
+          <p:cNvPr id="80" name="Conector reto 79">
+            <a:extLst>
+              <a:ext uri="{FF2B5EF4-FFF2-40B4-BE49-F238E27FC236}">
+                <a16:creationId xmlns:a16="http://schemas.microsoft.com/office/drawing/2014/main" id="{73F74C92-CD30-49B2-8BEC-F84A857A515C}"/>
+              </a:ext>
+            </a:extLst>
+          </p:cNvPr>
+          <p:cNvCxnSpPr>
+            <a:cxnSpLocks/>
+          </p:cNvCxnSpPr>
+          <p:nvPr/>
+        </p:nvCxnSpPr>
+        <p:spPr>
+          <a:xfrm>
+            <a:off x="2047754" y="1022619"/>
+            <a:ext cx="8096491" cy="0"/>
+          </a:xfrm>
+          <a:prstGeom prst="line">
+            <a:avLst/>
+          </a:prstGeom>
+          <a:ln>
+            <a:solidFill>
+              <a:srgbClr val="002060"/>
+            </a:solidFill>
+          </a:ln>
+        </p:spPr>
+        <p:style>
+          <a:lnRef idx="1">
+            <a:schemeClr val="accent1"/>
+          </a:lnRef>
+          <a:fillRef idx="0">
+            <a:schemeClr val="accent1"/>
+          </a:fillRef>
+          <a:effectRef idx="0">
+            <a:schemeClr val="accent1"/>
+          </a:effectRef>
+          <a:fontRef idx="minor">
+            <a:schemeClr val="tx1"/>
+          </a:fontRef>
+        </p:style>
+      </p:cxnSp>
+      <p:pic>
+        <p:nvPicPr>
+          <p:cNvPr id="87" name="Imagem 86" descr="Uma imagem contendo animal, coral&#10;&#10;Descrição gerada automaticamente">
+            <a:extLst>
+              <a:ext uri="{FF2B5EF4-FFF2-40B4-BE49-F238E27FC236}">
+                <a16:creationId xmlns:a16="http://schemas.microsoft.com/office/drawing/2014/main" id="{79C824A1-4C8D-4573-9C44-4018A1B6C0A4}"/>
+              </a:ext>
+            </a:extLst>
+          </p:cNvPr>
+          <p:cNvPicPr>
+            <a:picLocks noChangeAspect="1"/>
+          </p:cNvPicPr>
+          <p:nvPr/>
+        </p:nvPicPr>
+        <p:blipFill>
+          <a:blip r:embed="rId2">
+            <a:extLst>
+              <a:ext uri="{28A0092B-C50C-407E-A947-70E740481C1C}">
+                <a14:useLocalDpi xmlns:a14="http://schemas.microsoft.com/office/drawing/2010/main" val="0"/>
+              </a:ext>
+            </a:extLst>
+          </a:blip>
+          <a:stretch>
+            <a:fillRect/>
+          </a:stretch>
+        </p:blipFill>
+        <p:spPr>
+          <a:xfrm>
+            <a:off x="11140633" y="204276"/>
+            <a:ext cx="870219" cy="870219"/>
+          </a:xfrm>
+          <a:prstGeom prst="rect">
+            <a:avLst/>
+          </a:prstGeom>
+        </p:spPr>
+      </p:pic>
+      <p:sp>
+        <p:nvSpPr>
+          <p:cNvPr id="88" name="Retângulo 87">
+            <a:extLst>
+              <a:ext uri="{FF2B5EF4-FFF2-40B4-BE49-F238E27FC236}">
+                <a16:creationId xmlns:a16="http://schemas.microsoft.com/office/drawing/2014/main" id="{C8800477-D1CB-4ACF-8EFA-88E43DEE4EC5}"/>
+              </a:ext>
+            </a:extLst>
+          </p:cNvPr>
+          <p:cNvSpPr/>
+          <p:nvPr/>
+        </p:nvSpPr>
+        <p:spPr>
+          <a:xfrm>
+            <a:off x="0" y="6377782"/>
+            <a:ext cx="12192000" cy="480217"/>
+          </a:xfrm>
+          <a:prstGeom prst="rect">
+            <a:avLst/>
+          </a:prstGeom>
+          <a:solidFill>
+            <a:srgbClr val="4FBAF4"/>
+          </a:solidFill>
+          <a:ln>
+            <a:noFill/>
+          </a:ln>
+        </p:spPr>
+        <p:style>
+          <a:lnRef idx="2">
+            <a:schemeClr val="accent1">
+              <a:shade val="50000"/>
+            </a:schemeClr>
+          </a:lnRef>
+          <a:fillRef idx="1">
+            <a:schemeClr val="accent1"/>
+          </a:fillRef>
+          <a:effectRef idx="0">
+            <a:schemeClr val="accent1"/>
+          </a:effectRef>
+          <a:fontRef idx="minor">
+            <a:schemeClr val="lt1"/>
+          </a:fontRef>
+        </p:style>
+        <p:txBody>
+          <a:bodyPr rtlCol="0" anchor="ctr"/>
+          <a:lstStyle/>
+          <a:p>
+            <a:pPr algn="ctr"/>
+            <a:endParaRPr lang="pt-BR"/>
+          </a:p>
+        </p:txBody>
+      </p:sp>
       <p:graphicFrame>
         <p:nvGraphicFramePr>
           <p:cNvPr id="2" name="Tabela 2">
@@ -5852,14 +6747,14 @@
           <p:nvPr>
             <p:extLst>
               <p:ext uri="{D42A27DB-BD31-4B8C-83A1-F6EECF244321}">
-                <p14:modId xmlns:p14="http://schemas.microsoft.com/office/powerpoint/2010/main" val="986708237"/>
+                <p14:modId xmlns:p14="http://schemas.microsoft.com/office/powerpoint/2010/main" val="1529462041"/>
               </p:ext>
             </p:extLst>
           </p:nvPr>
         </p:nvGraphicFramePr>
         <p:xfrm>
-          <a:off x="1160522" y="1945640"/>
-          <a:ext cx="9870953" cy="2966720"/>
+          <a:off x="725411" y="1974916"/>
+          <a:ext cx="10850331" cy="3261360"/>
         </p:xfrm>
         <a:graphic>
           <a:graphicData uri="http://schemas.openxmlformats.org/drawingml/2006/table">
@@ -5868,21 +6763,21 @@
                 <a:tableStyleId>{7DF18680-E054-41AD-8BC1-D1AEF772440D}</a:tableStyleId>
               </a:tblPr>
               <a:tblGrid>
-                <a:gridCol w="650754">
+                <a:gridCol w="715321">
                   <a:extLst>
                     <a:ext uri="{9D8B030D-6E8A-4147-A177-3AD203B41FA5}">
                       <a16:colId xmlns:a16="http://schemas.microsoft.com/office/drawing/2014/main" val="2043689713"/>
                     </a:ext>
                   </a:extLst>
                 </a:gridCol>
-                <a:gridCol w="2755900">
+                <a:gridCol w="2179290">
                   <a:extLst>
                     <a:ext uri="{9D8B030D-6E8A-4147-A177-3AD203B41FA5}">
                       <a16:colId xmlns:a16="http://schemas.microsoft.com/office/drawing/2014/main" val="3855636959"/>
                     </a:ext>
                   </a:extLst>
                 </a:gridCol>
-                <a:gridCol w="6464299">
+                <a:gridCol w="7955720">
                   <a:extLst>
                     <a:ext uri="{9D8B030D-6E8A-4147-A177-3AD203B41FA5}">
                       <a16:colId xmlns:a16="http://schemas.microsoft.com/office/drawing/2014/main" val="410480492"/>
@@ -5898,7 +6793,7 @@
                     <a:p>
                       <a:pPr algn="ctr"/>
                       <a:r>
-                        <a:rPr lang="pt-BR" dirty="0"/>
+                        <a:rPr lang="pt-BR" sz="1400" dirty="0"/>
                         <a:t>Sigla</a:t>
                       </a:r>
                     </a:p>
@@ -5912,7 +6807,7 @@
                     <a:p>
                       <a:pPr algn="ctr"/>
                       <a:r>
-                        <a:rPr lang="pt-BR" dirty="0"/>
+                        <a:rPr lang="pt-BR" sz="1400" dirty="0"/>
                         <a:t>Nome</a:t>
                       </a:r>
                     </a:p>
@@ -5926,7 +6821,7 @@
                     <a:p>
                       <a:pPr algn="ctr"/>
                       <a:r>
-                        <a:rPr lang="pt-BR" dirty="0"/>
+                        <a:rPr lang="pt-BR" sz="1400" dirty="0"/>
                         <a:t>Exemplo</a:t>
                       </a:r>
                     </a:p>
@@ -5946,7 +6841,7 @@
                     <a:lstStyle/>
                     <a:p>
                       <a:r>
-                        <a:rPr lang="pt-BR" dirty="0"/>
+                        <a:rPr lang="pt-BR" sz="1400" dirty="0"/>
                         <a:t>Ex1</a:t>
                       </a:r>
                     </a:p>
@@ -5959,10 +6854,10 @@
                     <a:lstStyle/>
                     <a:p>
                       <a:r>
-                        <a:rPr lang="pt-BR" dirty="0" err="1"/>
+                        <a:rPr lang="pt-BR" sz="1400" dirty="0" err="1"/>
                         <a:t>IdentifierFormatException</a:t>
                       </a:r>
-                      <a:endParaRPr lang="pt-BR" dirty="0"/>
+                      <a:endParaRPr lang="pt-BR" sz="1400" dirty="0"/>
                     </a:p>
                   </a:txBody>
                   <a:tcPr/>
@@ -5972,7 +6867,54 @@
                     <a:bodyPr/>
                     <a:lstStyle/>
                     <a:p>
-                      <a:endParaRPr lang="pt-BR" dirty="0"/>
+                      <a:r>
+                        <a:rPr lang="pt-BR" sz="1400" dirty="0" err="1"/>
+                        <a:t>Exception</a:t>
+                      </a:r>
+                      <a:r>
+                        <a:rPr lang="pt-BR" sz="1400" dirty="0"/>
+                        <a:t> in thread "</a:t>
+                      </a:r>
+                      <a:r>
+                        <a:rPr lang="pt-BR" sz="1400" dirty="0" err="1"/>
+                        <a:t>main</a:t>
+                      </a:r>
+                      <a:r>
+                        <a:rPr lang="pt-BR" sz="1400" dirty="0"/>
+                        <a:t>" </a:t>
+                      </a:r>
+                      <a:r>
+                        <a:rPr lang="pt-BR" sz="1400" dirty="0" err="1"/>
+                        <a:t>br.com.compiler.exceptions.IdentifierFormat</a:t>
+                      </a:r>
+                      <a:r>
+                        <a:rPr lang="pt-BR" sz="1400" dirty="0"/>
+                        <a:t>: </a:t>
+                      </a:r>
+                      <a:r>
+                        <a:rPr lang="pt-BR" sz="1400" dirty="0" err="1"/>
+                        <a:t>Bad</a:t>
+                      </a:r>
+                      <a:r>
+                        <a:rPr lang="pt-BR" sz="1400" dirty="0"/>
+                        <a:t> Format </a:t>
+                      </a:r>
+                      <a:r>
+                        <a:rPr lang="pt-BR" sz="1400" dirty="0" err="1"/>
+                        <a:t>Identifier</a:t>
+                      </a:r>
+                      <a:r>
+                        <a:rPr lang="pt-BR" sz="1400" dirty="0"/>
+                        <a:t>: </a:t>
+                      </a:r>
+                      <a:r>
+                        <a:rPr lang="pt-BR" sz="1400" dirty="0" err="1"/>
+                        <a:t>identifier</a:t>
+                      </a:r>
+                      <a:r>
+                        <a:rPr lang="pt-BR" sz="1400" dirty="0"/>
+                        <a:t>@</a:t>
+                      </a:r>
                     </a:p>
                   </a:txBody>
                   <a:tcPr/>
@@ -5990,7 +6932,7 @@
                     <a:lstStyle/>
                     <a:p>
                       <a:r>
-                        <a:rPr lang="pt-BR" dirty="0"/>
+                        <a:rPr lang="pt-BR" sz="1400" dirty="0"/>
                         <a:t>Ex2</a:t>
                       </a:r>
                     </a:p>
@@ -6003,10 +6945,10 @@
                     <a:lstStyle/>
                     <a:p>
                       <a:r>
-                        <a:rPr lang="pt-BR" dirty="0" err="1"/>
+                        <a:rPr lang="pt-BR" sz="1400" dirty="0" err="1"/>
                         <a:t>NumberFormatException</a:t>
                       </a:r>
-                      <a:endParaRPr lang="pt-BR" dirty="0"/>
+                      <a:endParaRPr lang="pt-BR" sz="1400" dirty="0"/>
                     </a:p>
                   </a:txBody>
                   <a:tcPr/>
@@ -6016,7 +6958,18 @@
                     <a:bodyPr/>
                     <a:lstStyle/>
                     <a:p>
-                      <a:endParaRPr lang="pt-BR" dirty="0"/>
+                      <a:r>
+                        <a:rPr lang="en-US" sz="1400" dirty="0"/>
+                        <a:t>Exception in thread "main" </a:t>
+                      </a:r>
+                      <a:r>
+                        <a:rPr lang="en-US" sz="1400" dirty="0" err="1"/>
+                        <a:t>br.com.compiler.exceptions.NumberFormat</a:t>
+                      </a:r>
+                      <a:r>
+                        <a:rPr lang="en-US" sz="1400" dirty="0"/>
+                        <a:t>: Bad Format of Integer Number : 10abc</a:t>
+                      </a:r>
                     </a:p>
                   </a:txBody>
                   <a:tcPr/>
@@ -6034,7 +6987,7 @@
                     <a:lstStyle/>
                     <a:p>
                       <a:r>
-                        <a:rPr lang="pt-BR" dirty="0"/>
+                        <a:rPr lang="pt-BR" sz="1400" dirty="0"/>
                         <a:t>Ex3</a:t>
                       </a:r>
                     </a:p>
@@ -6047,10 +7000,10 @@
                     <a:lstStyle/>
                     <a:p>
                       <a:r>
-                        <a:rPr lang="pt-BR" dirty="0" err="1"/>
+                        <a:rPr lang="pt-BR" sz="1400" dirty="0" err="1"/>
                         <a:t>NumberFormatExeption</a:t>
                       </a:r>
-                      <a:endParaRPr lang="pt-BR" dirty="0"/>
+                      <a:endParaRPr lang="pt-BR" sz="1400" dirty="0"/>
                     </a:p>
                   </a:txBody>
                   <a:tcPr/>
@@ -6060,7 +7013,19 @@
                     <a:bodyPr/>
                     <a:lstStyle/>
                     <a:p>
-                      <a:endParaRPr lang="pt-BR" dirty="0"/>
+                      <a:r>
+                        <a:rPr lang="en-US" sz="1400" dirty="0"/>
+                        <a:t>Exception in thread "main" </a:t>
+                      </a:r>
+                      <a:r>
+                        <a:rPr lang="en-US" sz="1400" dirty="0" err="1"/>
+                        <a:t>br.com.compiler.exceptions.NumberFormat</a:t>
+                      </a:r>
+                      <a:r>
+                        <a:rPr lang="en-US" sz="1400" dirty="0"/>
+                        <a:t>: Bad Format of Float Number : 1.1aaa</a:t>
+                      </a:r>
+                      <a:endParaRPr lang="pt-BR" sz="1400" dirty="0"/>
                     </a:p>
                   </a:txBody>
                   <a:tcPr/>
@@ -6078,7 +7043,7 @@
                     <a:lstStyle/>
                     <a:p>
                       <a:r>
-                        <a:rPr lang="pt-BR" dirty="0"/>
+                        <a:rPr lang="pt-BR" sz="1400" dirty="0"/>
                         <a:t>Ex4</a:t>
                       </a:r>
                     </a:p>
@@ -6091,10 +7056,10 @@
                     <a:lstStyle/>
                     <a:p>
                       <a:r>
-                        <a:rPr lang="pt-BR" dirty="0" err="1"/>
+                        <a:rPr lang="pt-BR" sz="1400" dirty="0" err="1"/>
                         <a:t>InvalidOperatorException</a:t>
                       </a:r>
-                      <a:endParaRPr lang="pt-BR" dirty="0"/>
+                      <a:endParaRPr lang="pt-BR" sz="1400" dirty="0"/>
                     </a:p>
                   </a:txBody>
                   <a:tcPr/>
@@ -6104,7 +7069,46 @@
                     <a:bodyPr/>
                     <a:lstStyle/>
                     <a:p>
-                      <a:endParaRPr lang="pt-BR" dirty="0"/>
+                      <a:r>
+                        <a:rPr lang="pt-BR" sz="1400" dirty="0" err="1"/>
+                        <a:t>Exception</a:t>
+                      </a:r>
+                      <a:r>
+                        <a:rPr lang="pt-BR" sz="1400" dirty="0"/>
+                        <a:t> in thread "</a:t>
+                      </a:r>
+                      <a:r>
+                        <a:rPr lang="pt-BR" sz="1400" dirty="0" err="1"/>
+                        <a:t>main</a:t>
+                      </a:r>
+                      <a:r>
+                        <a:rPr lang="pt-BR" sz="1400" dirty="0"/>
+                        <a:t>" </a:t>
+                      </a:r>
+                      <a:r>
+                        <a:rPr lang="pt-BR" sz="1400" dirty="0" err="1"/>
+                        <a:t>br.com.compiler.exceptions.InvalidOperator</a:t>
+                      </a:r>
+                      <a:r>
+                        <a:rPr lang="pt-BR" sz="1400" dirty="0"/>
+                        <a:t>: </a:t>
+                      </a:r>
+                      <a:r>
+                        <a:rPr lang="pt-BR" sz="1400" dirty="0" err="1"/>
+                        <a:t>Invalid</a:t>
+                      </a:r>
+                      <a:r>
+                        <a:rPr lang="pt-BR" sz="1400" dirty="0"/>
+                        <a:t> </a:t>
+                      </a:r>
+                      <a:r>
+                        <a:rPr lang="pt-BR" sz="1400" dirty="0" err="1"/>
+                        <a:t>Operator</a:t>
+                      </a:r>
+                      <a:r>
+                        <a:rPr lang="pt-BR" sz="1400" dirty="0"/>
+                        <a:t> : ===</a:t>
+                      </a:r>
                     </a:p>
                   </a:txBody>
                   <a:tcPr/>
@@ -6122,7 +7126,7 @@
                     <a:lstStyle/>
                     <a:p>
                       <a:r>
-                        <a:rPr lang="pt-BR" dirty="0"/>
+                        <a:rPr lang="pt-BR" sz="1400" dirty="0"/>
                         <a:t>Ex5</a:t>
                       </a:r>
                     </a:p>
@@ -6135,10 +7139,10 @@
                     <a:lstStyle/>
                     <a:p>
                       <a:r>
-                        <a:rPr lang="pt-BR" dirty="0" err="1"/>
+                        <a:rPr lang="pt-BR" sz="1400" dirty="0" err="1"/>
                         <a:t>UnclosedException</a:t>
                       </a:r>
-                      <a:endParaRPr lang="pt-BR" dirty="0"/>
+                      <a:endParaRPr lang="pt-BR" sz="1400" dirty="0"/>
                     </a:p>
                   </a:txBody>
                   <a:tcPr/>
@@ -6148,7 +7152,19 @@
                     <a:bodyPr/>
                     <a:lstStyle/>
                     <a:p>
-                      <a:endParaRPr lang="pt-BR" dirty="0"/>
+                      <a:r>
+                        <a:rPr lang="en-US" sz="1400" dirty="0"/>
+                        <a:t>Exception in thread "main" </a:t>
+                      </a:r>
+                      <a:r>
+                        <a:rPr lang="en-US" sz="1400" dirty="0" err="1"/>
+                        <a:t>br.com.compiler.exceptions.Unclosed</a:t>
+                      </a:r>
+                      <a:r>
+                        <a:rPr lang="en-US" sz="1400" dirty="0"/>
+                        <a:t>: Unclosed Char: 'a</a:t>
+                      </a:r>
+                      <a:endParaRPr lang="pt-BR" sz="1400" dirty="0"/>
                     </a:p>
                   </a:txBody>
                   <a:tcPr/>
@@ -6166,7 +7182,7 @@
                     <a:lstStyle/>
                     <a:p>
                       <a:r>
-                        <a:rPr lang="pt-BR" dirty="0"/>
+                        <a:rPr lang="pt-BR" sz="1400" dirty="0"/>
                         <a:t>Ex6</a:t>
                       </a:r>
                     </a:p>
@@ -6196,10 +7212,10 @@
                         <a:defRPr/>
                       </a:pPr>
                       <a:r>
-                        <a:rPr lang="pt-BR" dirty="0" err="1"/>
+                        <a:rPr lang="pt-BR" sz="1400" dirty="0" err="1"/>
                         <a:t>EmptyCharException</a:t>
                       </a:r>
-                      <a:endParaRPr lang="pt-BR" dirty="0"/>
+                      <a:endParaRPr lang="pt-BR" sz="1400" dirty="0"/>
                     </a:p>
                   </a:txBody>
                   <a:tcPr/>
@@ -6209,7 +7225,19 @@
                     <a:bodyPr/>
                     <a:lstStyle/>
                     <a:p>
-                      <a:endParaRPr lang="pt-BR" dirty="0"/>
+                      <a:r>
+                        <a:rPr lang="en-US" sz="1400" dirty="0"/>
+                        <a:t>Exception in thread "main" </a:t>
+                      </a:r>
+                      <a:r>
+                        <a:rPr lang="en-US" sz="1400" dirty="0" err="1"/>
+                        <a:t>br.com.compiler.exceptions.EmptyChar</a:t>
+                      </a:r>
+                      <a:r>
+                        <a:rPr lang="en-US" sz="1400" dirty="0"/>
+                        <a:t>: Empty Character Literal: ''</a:t>
+                      </a:r>
+                      <a:endParaRPr lang="pt-BR" sz="1400" dirty="0"/>
                     </a:p>
                   </a:txBody>
                   <a:tcPr/>
@@ -6227,7 +7255,7 @@
                     <a:lstStyle/>
                     <a:p>
                       <a:r>
-                        <a:rPr lang="pt-BR" dirty="0"/>
+                        <a:rPr lang="pt-BR" sz="1400" dirty="0"/>
                         <a:t>Ex7</a:t>
                       </a:r>
                     </a:p>
@@ -6257,10 +7285,10 @@
                         <a:defRPr/>
                       </a:pPr>
                       <a:r>
-                        <a:rPr lang="pt-BR" dirty="0" err="1"/>
+                        <a:rPr lang="pt-BR" sz="1400" dirty="0" err="1"/>
                         <a:t>InvalidSymbolException</a:t>
                       </a:r>
-                      <a:endParaRPr lang="pt-BR" dirty="0"/>
+                      <a:endParaRPr lang="pt-BR" sz="1400" dirty="0"/>
                     </a:p>
                   </a:txBody>
                   <a:tcPr/>
@@ -6270,7 +7298,19 @@
                     <a:bodyPr/>
                     <a:lstStyle/>
                     <a:p>
-                      <a:endParaRPr lang="pt-BR" dirty="0"/>
+                      <a:r>
+                        <a:rPr lang="en-US" sz="1400" dirty="0"/>
+                        <a:t>Exception in thread "main" </a:t>
+                      </a:r>
+                      <a:r>
+                        <a:rPr lang="en-US" sz="1400" dirty="0" err="1"/>
+                        <a:t>br.com.compiler.exceptions.InvalidSymbol</a:t>
+                      </a:r>
+                      <a:r>
+                        <a:rPr lang="en-US" sz="1400" dirty="0"/>
+                        <a:t>: Unrecognized Symbol: $</a:t>
+                      </a:r>
+                      <a:endParaRPr lang="pt-BR" sz="1400" dirty="0"/>
                     </a:p>
                   </a:txBody>
                   <a:tcPr/>
@@ -6295,13 +7335,13 @@
   <p:clrMapOvr>
     <a:masterClrMapping/>
   </p:clrMapOvr>
-  <mc:AlternateContent xmlns:mc="http://schemas.openxmlformats.org/markup-compatibility/2006">
-    <mc:Choice xmlns:p14="http://schemas.microsoft.com/office/powerpoint/2010/main" Requires="p14">
+  <mc:AlternateContent xmlns:mc="http://schemas.openxmlformats.org/markup-compatibility/2006" xmlns:p14="http://schemas.microsoft.com/office/powerpoint/2010/main">
+    <mc:Choice Requires="p14">
       <p:transition spd="med" p14:dur="700">
         <p:fade/>
       </p:transition>
     </mc:Choice>
-    <mc:Fallback>
+    <mc:Fallback xmlns="">
       <p:transition spd="med">
         <p:fade/>
       </p:transition>
@@ -7829,13 +8869,13 @@
   <p:clrMapOvr>
     <a:masterClrMapping/>
   </p:clrMapOvr>
-  <mc:AlternateContent xmlns:mc="http://schemas.openxmlformats.org/markup-compatibility/2006">
-    <mc:Choice xmlns:p159="http://schemas.microsoft.com/office/powerpoint/2015/09/main" Requires="p159">
+  <mc:AlternateContent xmlns:mc="http://schemas.openxmlformats.org/markup-compatibility/2006" xmlns:p159="http://schemas.microsoft.com/office/powerpoint/2015/09/main">
+    <mc:Choice Requires="p159">
       <p:transition xmlns:p14="http://schemas.microsoft.com/office/powerpoint/2010/main" spd="slow" p14:dur="2000">
         <p159:morph option="byObject"/>
       </p:transition>
     </mc:Choice>
-    <mc:Fallback>
+    <mc:Fallback xmlns="">
       <p:transition spd="slow">
         <p:fade/>
       </p:transition>
@@ -10608,13 +11648,13 @@
   <p:clrMapOvr>
     <a:masterClrMapping/>
   </p:clrMapOvr>
-  <mc:AlternateContent xmlns:mc="http://schemas.openxmlformats.org/markup-compatibility/2006">
-    <mc:Choice xmlns:p14="http://schemas.microsoft.com/office/powerpoint/2010/main" Requires="p14">
+  <mc:AlternateContent xmlns:mc="http://schemas.openxmlformats.org/markup-compatibility/2006" xmlns:p14="http://schemas.microsoft.com/office/powerpoint/2010/main">
+    <mc:Choice Requires="p14">
       <p:transition spd="med" p14:dur="700">
         <p:fade/>
       </p:transition>
     </mc:Choice>
-    <mc:Fallback>
+    <mc:Fallback xmlns="">
       <p:transition spd="med">
         <p:fade/>
       </p:transition>
@@ -11525,13 +12565,13 @@
   <p:clrMapOvr>
     <a:masterClrMapping/>
   </p:clrMapOvr>
-  <mc:AlternateContent xmlns:mc="http://schemas.openxmlformats.org/markup-compatibility/2006">
-    <mc:Choice xmlns:p14="http://schemas.microsoft.com/office/powerpoint/2010/main" Requires="p14">
+  <mc:AlternateContent xmlns:mc="http://schemas.openxmlformats.org/markup-compatibility/2006" xmlns:p14="http://schemas.microsoft.com/office/powerpoint/2010/main">
+    <mc:Choice Requires="p14">
       <p:transition spd="med" p14:dur="700">
         <p:fade/>
       </p:transition>
     </mc:Choice>
-    <mc:Fallback>
+    <mc:Fallback xmlns="">
       <p:transition spd="med">
         <p:fade/>
       </p:transition>
@@ -12847,13 +13887,13 @@
   <p:clrMapOvr>
     <a:masterClrMapping/>
   </p:clrMapOvr>
-  <mc:AlternateContent xmlns:mc="http://schemas.openxmlformats.org/markup-compatibility/2006">
-    <mc:Choice xmlns:p14="http://schemas.microsoft.com/office/powerpoint/2010/main" Requires="p14">
+  <mc:AlternateContent xmlns:mc="http://schemas.openxmlformats.org/markup-compatibility/2006" xmlns:p14="http://schemas.microsoft.com/office/powerpoint/2010/main">
+    <mc:Choice Requires="p14">
       <p:transition spd="med" p14:dur="700">
         <p:fade/>
       </p:transition>
     </mc:Choice>
-    <mc:Fallback>
+    <mc:Fallback xmlns="">
       <p:transition spd="med">
         <p:fade/>
       </p:transition>
@@ -14188,13 +15228,13 @@
   <p:clrMapOvr>
     <a:masterClrMapping/>
   </p:clrMapOvr>
-  <mc:AlternateContent xmlns:mc="http://schemas.openxmlformats.org/markup-compatibility/2006">
-    <mc:Choice xmlns:p14="http://schemas.microsoft.com/office/powerpoint/2010/main" Requires="p14">
+  <mc:AlternateContent xmlns:mc="http://schemas.openxmlformats.org/markup-compatibility/2006" xmlns:p14="http://schemas.microsoft.com/office/powerpoint/2010/main">
+    <mc:Choice Requires="p14">
       <p:transition spd="med" p14:dur="700">
         <p:fade/>
       </p:transition>
     </mc:Choice>
-    <mc:Fallback>
+    <mc:Fallback xmlns="">
       <p:transition spd="med">
         <p:fade/>
       </p:transition>
@@ -15375,13 +16415,13 @@
   <p:clrMapOvr>
     <a:masterClrMapping/>
   </p:clrMapOvr>
-  <mc:AlternateContent xmlns:mc="http://schemas.openxmlformats.org/markup-compatibility/2006">
-    <mc:Choice xmlns:p14="http://schemas.microsoft.com/office/powerpoint/2010/main" Requires="p14">
+  <mc:AlternateContent xmlns:mc="http://schemas.openxmlformats.org/markup-compatibility/2006" xmlns:p14="http://schemas.microsoft.com/office/powerpoint/2010/main">
+    <mc:Choice Requires="p14">
       <p:transition spd="med" p14:dur="700">
         <p:fade/>
       </p:transition>
     </mc:Choice>
-    <mc:Fallback>
+    <mc:Fallback xmlns="">
       <p:transition spd="med">
         <p:fade/>
       </p:transition>
@@ -16213,13 +17253,13 @@
   <p:clrMapOvr>
     <a:masterClrMapping/>
   </p:clrMapOvr>
-  <mc:AlternateContent xmlns:mc="http://schemas.openxmlformats.org/markup-compatibility/2006">
-    <mc:Choice xmlns:p14="http://schemas.microsoft.com/office/powerpoint/2010/main" Requires="p14">
+  <mc:AlternateContent xmlns:mc="http://schemas.openxmlformats.org/markup-compatibility/2006" xmlns:p14="http://schemas.microsoft.com/office/powerpoint/2010/main">
+    <mc:Choice Requires="p14">
       <p:transition spd="med" p14:dur="700">
         <p:fade/>
       </p:transition>
     </mc:Choice>
-    <mc:Fallback>
+    <mc:Fallback xmlns="">
       <p:transition spd="med">
         <p:fade/>
       </p:transition>
@@ -17333,13 +18373,13 @@
   <p:clrMapOvr>
     <a:masterClrMapping/>
   </p:clrMapOvr>
-  <mc:AlternateContent xmlns:mc="http://schemas.openxmlformats.org/markup-compatibility/2006">
-    <mc:Choice xmlns:p14="http://schemas.microsoft.com/office/powerpoint/2010/main" Requires="p14">
+  <mc:AlternateContent xmlns:mc="http://schemas.openxmlformats.org/markup-compatibility/2006" xmlns:p14="http://schemas.microsoft.com/office/powerpoint/2010/main">
+    <mc:Choice Requires="p14">
       <p:transition spd="med" p14:dur="700">
         <p:fade/>
       </p:transition>
     </mc:Choice>
-    <mc:Fallback>
+    <mc:Fallback xmlns="">
       <p:transition spd="med">
         <p:fade/>
       </p:transition>

</xml_diff>